<commit_message>
More changes to Preso
</commit_message>
<xml_diff>
--- a/Final_Data/Deliverables/Presentation.pptx
+++ b/Final_Data/Deliverables/Presentation.pptx
@@ -6,20 +6,23 @@
   </p:sldMasterIdLst>
   <p:sldIdLst>
     <p:sldId id="256" r:id="rId2"/>
-    <p:sldId id="257" r:id="rId3"/>
-    <p:sldId id="258" r:id="rId4"/>
-    <p:sldId id="259" r:id="rId5"/>
-    <p:sldId id="260" r:id="rId6"/>
-    <p:sldId id="261" r:id="rId7"/>
-    <p:sldId id="262" r:id="rId8"/>
-    <p:sldId id="263" r:id="rId9"/>
-    <p:sldId id="264" r:id="rId10"/>
-    <p:sldId id="266" r:id="rId11"/>
-    <p:sldId id="271" r:id="rId12"/>
-    <p:sldId id="267" r:id="rId13"/>
-    <p:sldId id="268" r:id="rId14"/>
-    <p:sldId id="269" r:id="rId15"/>
-    <p:sldId id="270" r:id="rId16"/>
+    <p:sldId id="272" r:id="rId3"/>
+    <p:sldId id="257" r:id="rId4"/>
+    <p:sldId id="258" r:id="rId5"/>
+    <p:sldId id="259" r:id="rId6"/>
+    <p:sldId id="260" r:id="rId7"/>
+    <p:sldId id="261" r:id="rId8"/>
+    <p:sldId id="262" r:id="rId9"/>
+    <p:sldId id="263" r:id="rId10"/>
+    <p:sldId id="264" r:id="rId11"/>
+    <p:sldId id="266" r:id="rId12"/>
+    <p:sldId id="271" r:id="rId13"/>
+    <p:sldId id="267" r:id="rId14"/>
+    <p:sldId id="268" r:id="rId15"/>
+    <p:sldId id="269" r:id="rId16"/>
+    <p:sldId id="270" r:id="rId17"/>
+    <p:sldId id="274" r:id="rId18"/>
+    <p:sldId id="273" r:id="rId19"/>
   </p:sldIdLst>
   <p:sldSz cx="9144000" cy="6858000" type="screen4x3"/>
   <p:notesSz cx="6858000" cy="9144000"/>
@@ -6262,7 +6265,7 @@
           <a:p>
             <a:r>
               <a:rPr lang="en-US" dirty="0" smtClean="0"/>
-              <a:t>Modeling Results, Features</a:t>
+              <a:t>Modeling Approach</a:t>
             </a:r>
             <a:endParaRPr lang="en-US" dirty="0"/>
           </a:p>
@@ -6270,7 +6273,77 @@
       </p:sp>
       <p:sp>
         <p:nvSpPr>
-          <p:cNvPr id="8" name="Content Placeholder 2"/>
+          <p:cNvPr id="3" name="Content Placeholder 2"/>
+          <p:cNvSpPr>
+            <a:spLocks noGrp="1"/>
+          </p:cNvSpPr>
+          <p:nvPr>
+            <p:ph sz="quarter" idx="1"/>
+          </p:nvPr>
+        </p:nvSpPr>
+        <p:spPr>
+          <a:xfrm>
+            <a:off x="513410" y="1677069"/>
+            <a:ext cx="3569653" cy="4572000"/>
+          </a:xfrm>
+        </p:spPr>
+        <p:txBody>
+          <a:bodyPr rIns="457200">
+            <a:normAutofit/>
+          </a:bodyPr>
+          <a:lstStyle/>
+          <a:p>
+            <a:pPr marL="0" indent="0">
+              <a:buNone/>
+            </a:pPr>
+            <a:r>
+              <a:rPr lang="en-US" sz="2400" dirty="0" err="1" smtClean="0"/>
+              <a:t>Logit</a:t>
+            </a:r>
+            <a:r>
+              <a:rPr lang="en-US" sz="2400" dirty="0" smtClean="0"/>
+              <a:t> Model</a:t>
+            </a:r>
+          </a:p>
+          <a:p>
+            <a:pPr marL="457200" indent="-457200">
+              <a:buFont typeface="+mj-lt"/>
+              <a:buAutoNum type="arabicPeriod"/>
+            </a:pPr>
+            <a:r>
+              <a:rPr lang="en-US" sz="2000" dirty="0" smtClean="0"/>
+              <a:t>Iterate through every feature combination</a:t>
+            </a:r>
+          </a:p>
+          <a:p>
+            <a:pPr marL="457200" indent="-457200">
+              <a:buFont typeface="+mj-lt"/>
+              <a:buAutoNum type="arabicPeriod"/>
+            </a:pPr>
+            <a:r>
+              <a:rPr lang="en-US" sz="2000" dirty="0" smtClean="0"/>
+              <a:t>Identify best fit</a:t>
+            </a:r>
+          </a:p>
+          <a:p>
+            <a:pPr marL="457200" indent="-457200">
+              <a:buFont typeface="+mj-lt"/>
+              <a:buAutoNum type="arabicPeriod"/>
+            </a:pPr>
+            <a:r>
+              <a:rPr lang="en-US" sz="2000" dirty="0" smtClean="0"/>
+              <a:t>Ensure best Adj. R</a:t>
+            </a:r>
+            <a:r>
+              <a:rPr lang="en-US" sz="2000" baseline="30000" dirty="0" smtClean="0"/>
+              <a:t>2</a:t>
+            </a:r>
+          </a:p>
+        </p:txBody>
+      </p:sp>
+      <p:sp>
+        <p:nvSpPr>
+          <p:cNvPr id="6" name="Content Placeholder 2"/>
           <p:cNvSpPr txBox="1">
             <a:spLocks/>
           </p:cNvSpPr>
@@ -6278,8 +6351,8 @@
         </p:nvSpPr>
         <p:spPr>
           <a:xfrm>
-            <a:off x="513410" y="1595669"/>
-            <a:ext cx="3328983" cy="4572000"/>
+            <a:off x="5266499" y="1677069"/>
+            <a:ext cx="3569653" cy="4572000"/>
           </a:xfrm>
           <a:prstGeom prst="rect">
             <a:avLst/>
@@ -6467,35 +6540,43 @@
             <a:pPr marL="0" indent="0">
               <a:buNone/>
             </a:pPr>
-            <a:endParaRPr lang="en-US" sz="2400" dirty="0"/>
-          </a:p>
-          <a:p>
-            <a:pPr marL="0" indent="0">
-              <a:buNone/>
+            <a:r>
+              <a:rPr lang="en-US" sz="2400" dirty="0" smtClean="0"/>
+              <a:t>Decision Tree Model</a:t>
+            </a:r>
+          </a:p>
+          <a:p>
+            <a:pPr marL="457200" indent="-457200">
+              <a:buFont typeface="+mj-lt"/>
+              <a:buAutoNum type="arabicPeriod"/>
             </a:pPr>
             <a:r>
-              <a:rPr lang="en-US" sz="2400" dirty="0" err="1" smtClean="0"/>
-              <a:t>Logit</a:t>
-            </a:r>
-            <a:r>
-              <a:rPr lang="en-US" sz="2400" dirty="0" smtClean="0"/>
-              <a:t> Model: </a:t>
-            </a:r>
-          </a:p>
-          <a:p>
-            <a:pPr marL="0" indent="0">
-              <a:buNone/>
+              <a:rPr lang="en-US" sz="2000" dirty="0" smtClean="0"/>
+              <a:t>Minimize tree depth</a:t>
+            </a:r>
+            <a:endParaRPr lang="en-US" sz="2000" dirty="0"/>
+          </a:p>
+          <a:p>
+            <a:pPr marL="457200" indent="-457200">
+              <a:buFont typeface="+mj-lt"/>
+              <a:buAutoNum type="arabicPeriod"/>
             </a:pPr>
             <a:r>
-              <a:rPr lang="en-US" sz="1800" dirty="0" smtClean="0"/>
-              <a:t>Fenwick For and PDO</a:t>
-            </a:r>
-          </a:p>
-          <a:p>
-            <a:pPr marL="0" indent="0">
-              <a:buNone/>
+              <a:rPr lang="en-US" sz="2000" dirty="0" smtClean="0"/>
+              <a:t>Use even splits</a:t>
+            </a:r>
+            <a:endParaRPr lang="en-US" sz="2000" dirty="0"/>
+          </a:p>
+          <a:p>
+            <a:pPr marL="457200" indent="-457200">
+              <a:buFont typeface="+mj-lt"/>
+              <a:buAutoNum type="arabicPeriod"/>
             </a:pPr>
-            <a:endParaRPr lang="en-US" sz="2400" dirty="0"/>
+            <a:r>
+              <a:rPr lang="en-US" sz="2000" dirty="0" smtClean="0"/>
+              <a:t>Strong confidence in results</a:t>
+            </a:r>
+            <a:endParaRPr lang="en-US" sz="2000" baseline="30000" dirty="0"/>
           </a:p>
           <a:p>
             <a:pPr marL="0" indent="0">
@@ -6503,47 +6584,11 @@
             </a:pPr>
             <a:endParaRPr lang="en-US" sz="2400" dirty="0" smtClean="0"/>
           </a:p>
-          <a:p>
-            <a:pPr marL="0" indent="0">
-              <a:buNone/>
-            </a:pPr>
-            <a:endParaRPr lang="en-US" sz="2400" dirty="0"/>
-          </a:p>
-          <a:p>
-            <a:pPr marL="0" indent="0">
-              <a:buNone/>
-            </a:pPr>
-            <a:r>
-              <a:rPr lang="en-US" sz="2400" dirty="0" smtClean="0"/>
-              <a:t>Decision Tree Model</a:t>
-            </a:r>
-            <a:r>
-              <a:rPr lang="en-US" sz="2400" dirty="0"/>
-              <a:t>: </a:t>
-            </a:r>
-            <a:endParaRPr lang="en-US" sz="2400" dirty="0" smtClean="0"/>
-          </a:p>
-          <a:p>
-            <a:pPr marL="0" indent="0">
-              <a:buNone/>
-            </a:pPr>
-            <a:r>
-              <a:rPr lang="en-US" sz="1800" dirty="0" smtClean="0"/>
-              <a:t>Fenwick For, PDO &amp; Faceoff Win %</a:t>
-            </a:r>
-            <a:endParaRPr lang="en-US" sz="1800" dirty="0"/>
-          </a:p>
-          <a:p>
-            <a:pPr marL="0" indent="0">
-              <a:buNone/>
-            </a:pPr>
-            <a:endParaRPr lang="en-US" sz="2400" dirty="0" smtClean="0"/>
-          </a:p>
         </p:txBody>
       </p:sp>
       <p:pic>
         <p:nvPicPr>
-          <p:cNvPr id="5" name="Picture 4" descr="Screen Shot 2016-03-28 at 9.40.25 PM.png"/>
+          <p:cNvPr id="10" name="Picture 9" descr="Screen Shot 2016-03-28 at 9.32.45 PM.png"/>
           <p:cNvPicPr>
             <a:picLocks noChangeAspect="1"/>
           </p:cNvPicPr>
@@ -6563,8 +6608,8 @@
         </p:blipFill>
         <p:spPr>
           <a:xfrm>
-            <a:off x="3727334" y="1595669"/>
-            <a:ext cx="4897160" cy="1983752"/>
+            <a:off x="513410" y="3731784"/>
+            <a:ext cx="3733800" cy="1816100"/>
           </a:xfrm>
           <a:prstGeom prst="rect">
             <a:avLst/>
@@ -6573,7 +6618,7 @@
       </p:pic>
       <p:pic>
         <p:nvPicPr>
-          <p:cNvPr id="7" name="Picture 6" descr="NHL.png"/>
+          <p:cNvPr id="13" name="Picture 12" descr="Screen Shot 2016-03-28 at 9.33.22 PM.png"/>
           <p:cNvPicPr>
             <a:picLocks noChangeAspect="1"/>
           </p:cNvPicPr>
@@ -6593,8 +6638,8 @@
         </p:blipFill>
         <p:spPr>
           <a:xfrm>
-            <a:off x="4286894" y="3760707"/>
-            <a:ext cx="3733693" cy="2465309"/>
+            <a:off x="2718262" y="5330486"/>
+            <a:ext cx="6099392" cy="918583"/>
           </a:xfrm>
           <a:prstGeom prst="rect">
             <a:avLst/>
@@ -6604,7 +6649,7 @@
     </p:spTree>
     <p:extLst>
       <p:ext uri="{BB962C8B-B14F-4D97-AF65-F5344CB8AC3E}">
-        <p14:creationId xmlns:p14="http://schemas.microsoft.com/office/powerpoint/2010/main" val="1237590303"/>
+        <p14:creationId xmlns:p14="http://schemas.microsoft.com/office/powerpoint/2010/main" val="3955794720"/>
       </p:ext>
     </p:extLst>
   </p:cSld>
@@ -6648,7 +6693,7 @@
           <a:p>
             <a:r>
               <a:rPr lang="en-US" dirty="0" smtClean="0"/>
-              <a:t>Cross Validation</a:t>
+              <a:t>Modeling Results, Features</a:t>
             </a:r>
             <a:endParaRPr lang="en-US" dirty="0"/>
           </a:p>
@@ -6656,7 +6701,7 @@
       </p:sp>
       <p:sp>
         <p:nvSpPr>
-          <p:cNvPr id="7" name="Content Placeholder 2"/>
+          <p:cNvPr id="8" name="Content Placeholder 2"/>
           <p:cNvSpPr txBox="1">
             <a:spLocks/>
           </p:cNvSpPr>
@@ -6665,7 +6710,7 @@
         <p:spPr>
           <a:xfrm>
             <a:off x="513410" y="1595669"/>
-            <a:ext cx="8322742" cy="4572000"/>
+            <a:ext cx="3328983" cy="4572000"/>
           </a:xfrm>
           <a:prstGeom prst="rect">
             <a:avLst/>
@@ -6853,6 +6898,392 @@
             <a:pPr marL="0" indent="0">
               <a:buNone/>
             </a:pPr>
+            <a:endParaRPr lang="en-US" sz="2400" dirty="0"/>
+          </a:p>
+          <a:p>
+            <a:pPr marL="0" indent="0">
+              <a:buNone/>
+            </a:pPr>
+            <a:r>
+              <a:rPr lang="en-US" sz="2400" dirty="0" err="1" smtClean="0"/>
+              <a:t>Logit</a:t>
+            </a:r>
+            <a:r>
+              <a:rPr lang="en-US" sz="2400" dirty="0" smtClean="0"/>
+              <a:t> Model: </a:t>
+            </a:r>
+          </a:p>
+          <a:p>
+            <a:pPr marL="0" indent="0">
+              <a:buNone/>
+            </a:pPr>
+            <a:r>
+              <a:rPr lang="en-US" sz="1800" dirty="0" smtClean="0"/>
+              <a:t>Fenwick For and PDO</a:t>
+            </a:r>
+          </a:p>
+          <a:p>
+            <a:pPr marL="0" indent="0">
+              <a:buNone/>
+            </a:pPr>
+            <a:endParaRPr lang="en-US" sz="2400" dirty="0"/>
+          </a:p>
+          <a:p>
+            <a:pPr marL="0" indent="0">
+              <a:buNone/>
+            </a:pPr>
+            <a:endParaRPr lang="en-US" sz="2400" dirty="0" smtClean="0"/>
+          </a:p>
+          <a:p>
+            <a:pPr marL="0" indent="0">
+              <a:buNone/>
+            </a:pPr>
+            <a:endParaRPr lang="en-US" sz="2400" dirty="0"/>
+          </a:p>
+          <a:p>
+            <a:pPr marL="0" indent="0">
+              <a:buNone/>
+            </a:pPr>
+            <a:r>
+              <a:rPr lang="en-US" sz="2400" dirty="0" smtClean="0"/>
+              <a:t>Decision Tree Model</a:t>
+            </a:r>
+            <a:r>
+              <a:rPr lang="en-US" sz="2400" dirty="0"/>
+              <a:t>: </a:t>
+            </a:r>
+            <a:endParaRPr lang="en-US" sz="2400" dirty="0" smtClean="0"/>
+          </a:p>
+          <a:p>
+            <a:pPr marL="0" indent="0">
+              <a:buNone/>
+            </a:pPr>
+            <a:r>
+              <a:rPr lang="en-US" sz="1800" dirty="0" smtClean="0"/>
+              <a:t>Fenwick For, PDO &amp; Faceoff Win %</a:t>
+            </a:r>
+            <a:endParaRPr lang="en-US" sz="1800" dirty="0"/>
+          </a:p>
+          <a:p>
+            <a:pPr marL="0" indent="0">
+              <a:buNone/>
+            </a:pPr>
+            <a:endParaRPr lang="en-US" sz="2400" dirty="0" smtClean="0"/>
+          </a:p>
+        </p:txBody>
+      </p:sp>
+      <p:pic>
+        <p:nvPicPr>
+          <p:cNvPr id="5" name="Picture 4" descr="Screen Shot 2016-03-28 at 9.40.25 PM.png"/>
+          <p:cNvPicPr>
+            <a:picLocks noChangeAspect="1"/>
+          </p:cNvPicPr>
+          <p:nvPr/>
+        </p:nvPicPr>
+        <p:blipFill>
+          <a:blip r:embed="rId2">
+            <a:extLst>
+              <a:ext uri="{28A0092B-C50C-407E-A947-70E740481C1C}">
+                <a14:useLocalDpi xmlns:a14="http://schemas.microsoft.com/office/drawing/2010/main" val="0"/>
+              </a:ext>
+            </a:extLst>
+          </a:blip>
+          <a:stretch>
+            <a:fillRect/>
+          </a:stretch>
+        </p:blipFill>
+        <p:spPr>
+          <a:xfrm>
+            <a:off x="3727334" y="1595669"/>
+            <a:ext cx="4897160" cy="1983752"/>
+          </a:xfrm>
+          <a:prstGeom prst="rect">
+            <a:avLst/>
+          </a:prstGeom>
+        </p:spPr>
+      </p:pic>
+      <p:pic>
+        <p:nvPicPr>
+          <p:cNvPr id="7" name="Picture 6" descr="NHL.png"/>
+          <p:cNvPicPr>
+            <a:picLocks noChangeAspect="1"/>
+          </p:cNvPicPr>
+          <p:nvPr/>
+        </p:nvPicPr>
+        <p:blipFill>
+          <a:blip r:embed="rId3">
+            <a:extLst>
+              <a:ext uri="{28A0092B-C50C-407E-A947-70E740481C1C}">
+                <a14:useLocalDpi xmlns:a14="http://schemas.microsoft.com/office/drawing/2010/main" val="0"/>
+              </a:ext>
+            </a:extLst>
+          </a:blip>
+          <a:stretch>
+            <a:fillRect/>
+          </a:stretch>
+        </p:blipFill>
+        <p:spPr>
+          <a:xfrm>
+            <a:off x="4286894" y="3760707"/>
+            <a:ext cx="3733693" cy="2465309"/>
+          </a:xfrm>
+          <a:prstGeom prst="rect">
+            <a:avLst/>
+          </a:prstGeom>
+        </p:spPr>
+      </p:pic>
+    </p:spTree>
+    <p:extLst>
+      <p:ext uri="{BB962C8B-B14F-4D97-AF65-F5344CB8AC3E}">
+        <p14:creationId xmlns:p14="http://schemas.microsoft.com/office/powerpoint/2010/main" val="1237590303"/>
+      </p:ext>
+    </p:extLst>
+  </p:cSld>
+  <p:clrMapOvr>
+    <a:masterClrMapping/>
+  </p:clrMapOvr>
+</p:sld>
+</file>
+
+<file path=ppt/slides/slide12.xml><?xml version="1.0" encoding="utf-8"?>
+<p:sld xmlns:a="http://schemas.openxmlformats.org/drawingml/2006/main" xmlns:r="http://schemas.openxmlformats.org/officeDocument/2006/relationships" xmlns:p="http://schemas.openxmlformats.org/presentationml/2006/main">
+  <p:cSld>
+    <p:spTree>
+      <p:nvGrpSpPr>
+        <p:cNvPr id="1" name=""/>
+        <p:cNvGrpSpPr/>
+        <p:nvPr/>
+      </p:nvGrpSpPr>
+      <p:grpSpPr>
+        <a:xfrm>
+          <a:off x="0" y="0"/>
+          <a:ext cx="0" cy="0"/>
+          <a:chOff x="0" y="0"/>
+          <a:chExt cx="0" cy="0"/>
+        </a:xfrm>
+      </p:grpSpPr>
+      <p:sp>
+        <p:nvSpPr>
+          <p:cNvPr id="2" name="Title 1"/>
+          <p:cNvSpPr>
+            <a:spLocks noGrp="1"/>
+          </p:cNvSpPr>
+          <p:nvPr>
+            <p:ph type="title"/>
+          </p:nvPr>
+        </p:nvSpPr>
+        <p:spPr/>
+        <p:txBody>
+          <a:bodyPr/>
+          <a:lstStyle/>
+          <a:p>
+            <a:r>
+              <a:rPr lang="en-US" dirty="0" smtClean="0"/>
+              <a:t>Cross Validation</a:t>
+            </a:r>
+            <a:endParaRPr lang="en-US" dirty="0"/>
+          </a:p>
+        </p:txBody>
+      </p:sp>
+      <p:sp>
+        <p:nvSpPr>
+          <p:cNvPr id="7" name="Content Placeholder 2"/>
+          <p:cNvSpPr txBox="1">
+            <a:spLocks/>
+          </p:cNvSpPr>
+          <p:nvPr/>
+        </p:nvSpPr>
+        <p:spPr>
+          <a:xfrm>
+            <a:off x="513410" y="1595669"/>
+            <a:ext cx="8322742" cy="4572000"/>
+          </a:xfrm>
+          <a:prstGeom prst="rect">
+            <a:avLst/>
+          </a:prstGeom>
+        </p:spPr>
+        <p:txBody>
+          <a:bodyPr vert="horz" rIns="457200">
+            <a:normAutofit/>
+          </a:bodyPr>
+          <a:lstStyle>
+            <a:lvl1pPr marL="274320" indent="-274320" algn="l" rtl="0" eaLnBrk="1" latinLnBrk="0" hangingPunct="1">
+              <a:spcBef>
+                <a:spcPct val="20000"/>
+              </a:spcBef>
+              <a:buClr>
+                <a:schemeClr val="accent1"/>
+              </a:buClr>
+              <a:buSzPct val="85000"/>
+              <a:buFont typeface="Wingdings 2"/>
+              <a:buChar char=""/>
+              <a:defRPr kumimoji="0" sz="2700" kern="1200">
+                <a:solidFill>
+                  <a:schemeClr val="tx1"/>
+                </a:solidFill>
+                <a:latin typeface="+mn-lt"/>
+                <a:ea typeface="+mn-ea"/>
+                <a:cs typeface="+mn-cs"/>
+              </a:defRPr>
+            </a:lvl1pPr>
+            <a:lvl2pPr marL="548640" indent="-274320" algn="l" rtl="0" eaLnBrk="1" latinLnBrk="0" hangingPunct="1">
+              <a:spcBef>
+                <a:spcPct val="20000"/>
+              </a:spcBef>
+              <a:buClr>
+                <a:schemeClr val="accent2"/>
+              </a:buClr>
+              <a:buSzPct val="70000"/>
+              <a:buFont typeface="Wingdings"/>
+              <a:buChar char=""/>
+              <a:defRPr kumimoji="0" sz="2200" kern="1200">
+                <a:solidFill>
+                  <a:schemeClr val="tx2"/>
+                </a:solidFill>
+                <a:latin typeface="+mn-lt"/>
+                <a:ea typeface="+mn-ea"/>
+                <a:cs typeface="+mn-cs"/>
+              </a:defRPr>
+            </a:lvl2pPr>
+            <a:lvl3pPr marL="822960" indent="-228600" algn="l" rtl="0" eaLnBrk="1" latinLnBrk="0" hangingPunct="1">
+              <a:spcBef>
+                <a:spcPct val="20000"/>
+              </a:spcBef>
+              <a:buClr>
+                <a:schemeClr val="accent3"/>
+              </a:buClr>
+              <a:buSzPct val="75000"/>
+              <a:buFont typeface="Wingdings 2"/>
+              <a:buChar char=""/>
+              <a:defRPr kumimoji="0" sz="2000" kern="1200">
+                <a:solidFill>
+                  <a:schemeClr val="tx1"/>
+                </a:solidFill>
+                <a:latin typeface="+mn-lt"/>
+                <a:ea typeface="+mn-ea"/>
+                <a:cs typeface="+mn-cs"/>
+              </a:defRPr>
+            </a:lvl3pPr>
+            <a:lvl4pPr marL="1097280" indent="-228600" algn="l" rtl="0" eaLnBrk="1" latinLnBrk="0" hangingPunct="1">
+              <a:spcBef>
+                <a:spcPct val="20000"/>
+              </a:spcBef>
+              <a:buClr>
+                <a:schemeClr val="accent4"/>
+              </a:buClr>
+              <a:buSzPct val="70000"/>
+              <a:buFont typeface="Wingdings"/>
+              <a:buChar char=""/>
+              <a:defRPr kumimoji="0" sz="2000" kern="1200">
+                <a:solidFill>
+                  <a:schemeClr val="tx2"/>
+                </a:solidFill>
+                <a:latin typeface="+mn-lt"/>
+                <a:ea typeface="+mn-ea"/>
+                <a:cs typeface="+mn-cs"/>
+              </a:defRPr>
+            </a:lvl4pPr>
+            <a:lvl5pPr marL="1371600" indent="-228600" algn="l" rtl="0" eaLnBrk="1" latinLnBrk="0" hangingPunct="1">
+              <a:spcBef>
+                <a:spcPct val="20000"/>
+              </a:spcBef>
+              <a:buClr>
+                <a:schemeClr val="accent5"/>
+              </a:buClr>
+              <a:buFontTx/>
+              <a:buChar char="•"/>
+              <a:defRPr kumimoji="0" sz="1800" kern="1200">
+                <a:solidFill>
+                  <a:schemeClr val="tx1"/>
+                </a:solidFill>
+                <a:latin typeface="+mn-lt"/>
+                <a:ea typeface="+mn-ea"/>
+                <a:cs typeface="+mn-cs"/>
+              </a:defRPr>
+            </a:lvl5pPr>
+            <a:lvl6pPr marL="1645920" indent="-182880" algn="l" rtl="0" eaLnBrk="1" latinLnBrk="0" hangingPunct="1">
+              <a:spcBef>
+                <a:spcPct val="20000"/>
+              </a:spcBef>
+              <a:buClr>
+                <a:schemeClr val="accent6"/>
+              </a:buClr>
+              <a:buSzPct val="80000"/>
+              <a:buFont typeface="Wingdings 2"/>
+              <a:buChar char=""/>
+              <a:defRPr kumimoji="0" sz="1800" kern="1200">
+                <a:solidFill>
+                  <a:schemeClr val="tx1"/>
+                </a:solidFill>
+                <a:latin typeface="+mn-lt"/>
+                <a:ea typeface="+mn-ea"/>
+                <a:cs typeface="+mn-cs"/>
+              </a:defRPr>
+            </a:lvl6pPr>
+            <a:lvl7pPr marL="1920240" indent="-182880" algn="l" rtl="0" eaLnBrk="1" latinLnBrk="0" hangingPunct="1">
+              <a:spcBef>
+                <a:spcPct val="20000"/>
+              </a:spcBef>
+              <a:buClr>
+                <a:schemeClr val="accent1">
+                  <a:shade val="75000"/>
+                </a:schemeClr>
+              </a:buClr>
+              <a:buSzPct val="90000"/>
+              <a:buChar char="•"/>
+              <a:defRPr kumimoji="0" sz="1600" kern="1200" baseline="0">
+                <a:solidFill>
+                  <a:schemeClr val="tx1"/>
+                </a:solidFill>
+                <a:latin typeface="+mn-lt"/>
+                <a:ea typeface="+mn-ea"/>
+                <a:cs typeface="+mn-cs"/>
+              </a:defRPr>
+            </a:lvl7pPr>
+            <a:lvl8pPr marL="2103120" indent="-182880" algn="l" rtl="0" eaLnBrk="1" latinLnBrk="0" hangingPunct="1">
+              <a:spcBef>
+                <a:spcPct val="20000"/>
+              </a:spcBef>
+              <a:buClr>
+                <a:schemeClr val="accent4">
+                  <a:shade val="75000"/>
+                </a:schemeClr>
+              </a:buClr>
+              <a:buChar char="•"/>
+              <a:defRPr kumimoji="0" sz="1600" kern="1200">
+                <a:solidFill>
+                  <a:schemeClr val="tx1"/>
+                </a:solidFill>
+                <a:latin typeface="+mn-lt"/>
+                <a:ea typeface="+mn-ea"/>
+                <a:cs typeface="+mn-cs"/>
+              </a:defRPr>
+            </a:lvl8pPr>
+            <a:lvl9pPr marL="2377440" indent="-182880" algn="l" rtl="0" eaLnBrk="1" latinLnBrk="0" hangingPunct="1">
+              <a:spcBef>
+                <a:spcPct val="20000"/>
+              </a:spcBef>
+              <a:buClr>
+                <a:schemeClr val="accent2">
+                  <a:shade val="75000"/>
+                </a:schemeClr>
+              </a:buClr>
+              <a:buSzPct val="90000"/>
+              <a:buChar char="•"/>
+              <a:defRPr kumimoji="0" sz="1400" kern="1200" cap="all" baseline="0">
+                <a:solidFill>
+                  <a:schemeClr val="tx1"/>
+                </a:solidFill>
+                <a:latin typeface="+mn-lt"/>
+                <a:ea typeface="+mn-ea"/>
+                <a:cs typeface="+mn-cs"/>
+              </a:defRPr>
+            </a:lvl9pPr>
+          </a:lstStyle>
+          <a:p>
+            <a:pPr marL="0" indent="0">
+              <a:buNone/>
+            </a:pPr>
             <a:r>
               <a:rPr lang="en-US" sz="2000" dirty="0" smtClean="0"/>
               <a:t>Using </a:t>
@@ -6886,12 +7317,16 @@
               <a:t> were removed and the model with the best AUC curve and no </a:t>
             </a:r>
             <a:r>
-              <a:rPr lang="en-US" sz="1800" dirty="0" err="1" smtClean="0"/>
-              <a:t>colinearity</a:t>
+              <a:rPr lang="fi-FI" sz="1800" dirty="0" err="1" smtClean="0"/>
+              <a:t>collinearity</a:t>
             </a:r>
             <a:r>
               <a:rPr lang="en-US" sz="1800" dirty="0" smtClean="0"/>
-              <a:t> was chosen.</a:t>
+              <a:t> </a:t>
+            </a:r>
+            <a:r>
+              <a:rPr lang="en-US" sz="1800" dirty="0" smtClean="0"/>
+              <a:t>was chosen.</a:t>
             </a:r>
           </a:p>
           <a:p>
@@ -6908,7 +7343,6 @@
               <a:rPr lang="en-US" sz="2000" dirty="0" smtClean="0"/>
               <a:t>  </a:t>
             </a:r>
-            <a:endParaRPr lang="en-US" sz="2000" dirty="0" smtClean="0"/>
           </a:p>
         </p:txBody>
       </p:sp>
@@ -6991,7 +7425,7 @@
 </p:sld>
 </file>
 
-<file path=ppt/slides/slide12.xml><?xml version="1.0" encoding="utf-8"?>
+<file path=ppt/slides/slide13.xml><?xml version="1.0" encoding="utf-8"?>
 <p:sld xmlns:a="http://schemas.openxmlformats.org/drawingml/2006/main" xmlns:r="http://schemas.openxmlformats.org/officeDocument/2006/relationships" xmlns:p="http://schemas.openxmlformats.org/presentationml/2006/main">
   <p:cSld>
     <p:spTree>
@@ -7362,7 +7796,7 @@
 </p:sld>
 </file>
 
-<file path=ppt/slides/slide13.xml><?xml version="1.0" encoding="utf-8"?>
+<file path=ppt/slides/slide14.xml><?xml version="1.0" encoding="utf-8"?>
 <p:sld xmlns:a="http://schemas.openxmlformats.org/drawingml/2006/main" xmlns:r="http://schemas.openxmlformats.org/officeDocument/2006/relationships" xmlns:p="http://schemas.openxmlformats.org/presentationml/2006/main">
   <p:cSld>
     <p:spTree>
@@ -7436,129 +7870,6 @@
     <p:extLst>
       <p:ext uri="{BB962C8B-B14F-4D97-AF65-F5344CB8AC3E}">
         <p14:creationId xmlns:p14="http://schemas.microsoft.com/office/powerpoint/2010/main" val="2142637168"/>
-      </p:ext>
-    </p:extLst>
-  </p:cSld>
-  <p:clrMapOvr>
-    <a:masterClrMapping/>
-  </p:clrMapOvr>
-</p:sld>
-</file>
-
-<file path=ppt/slides/slide14.xml><?xml version="1.0" encoding="utf-8"?>
-<p:sld xmlns:a="http://schemas.openxmlformats.org/drawingml/2006/main" xmlns:r="http://schemas.openxmlformats.org/officeDocument/2006/relationships" xmlns:p="http://schemas.openxmlformats.org/presentationml/2006/main">
-  <p:cSld>
-    <p:spTree>
-      <p:nvGrpSpPr>
-        <p:cNvPr id="1" name=""/>
-        <p:cNvGrpSpPr/>
-        <p:nvPr/>
-      </p:nvGrpSpPr>
-      <p:grpSpPr>
-        <a:xfrm>
-          <a:off x="0" y="0"/>
-          <a:ext cx="0" cy="0"/>
-          <a:chOff x="0" y="0"/>
-          <a:chExt cx="0" cy="0"/>
-        </a:xfrm>
-      </p:grpSpPr>
-      <p:sp>
-        <p:nvSpPr>
-          <p:cNvPr id="2" name="Title 1"/>
-          <p:cNvSpPr>
-            <a:spLocks noGrp="1"/>
-          </p:cNvSpPr>
-          <p:nvPr>
-            <p:ph type="title"/>
-          </p:nvPr>
-        </p:nvSpPr>
-        <p:spPr/>
-        <p:txBody>
-          <a:bodyPr/>
-          <a:lstStyle/>
-          <a:p>
-            <a:r>
-              <a:rPr lang="en-US" dirty="0" smtClean="0"/>
-              <a:t>Results Retrospective</a:t>
-            </a:r>
-            <a:endParaRPr lang="en-US" dirty="0"/>
-          </a:p>
-        </p:txBody>
-      </p:sp>
-      <p:sp>
-        <p:nvSpPr>
-          <p:cNvPr id="5" name="Content Placeholder 2"/>
-          <p:cNvSpPr>
-            <a:spLocks noGrp="1"/>
-          </p:cNvSpPr>
-          <p:nvPr>
-            <p:ph sz="quarter" idx="1"/>
-          </p:nvPr>
-        </p:nvSpPr>
-        <p:spPr>
-          <a:xfrm>
-            <a:off x="513410" y="1791030"/>
-            <a:ext cx="8131974" cy="4572000"/>
-          </a:xfrm>
-        </p:spPr>
-        <p:txBody>
-          <a:bodyPr rIns="457200">
-            <a:normAutofit/>
-          </a:bodyPr>
-          <a:lstStyle/>
-          <a:p>
-            <a:r>
-              <a:rPr lang="en-US" sz="1800" dirty="0" smtClean="0"/>
-              <a:t>The results were better than I expected given the relatively small sample size.</a:t>
-            </a:r>
-          </a:p>
-          <a:p>
-            <a:r>
-              <a:rPr lang="en-US" sz="1800" dirty="0" smtClean="0"/>
-              <a:t>The decision tree model is easier to understand, however it does not make a definite binary conclusion on the data.</a:t>
-            </a:r>
-          </a:p>
-          <a:p>
-            <a:r>
-              <a:rPr lang="en-US" sz="1800" dirty="0" smtClean="0"/>
-              <a:t>The ROC Curve shows the better than average results compared with random chance.</a:t>
-            </a:r>
-          </a:p>
-          <a:p>
-            <a:endParaRPr lang="en-US" sz="1800" dirty="0"/>
-          </a:p>
-          <a:p>
-            <a:r>
-              <a:rPr lang="en-US" sz="1800" b="1" dirty="0" smtClean="0"/>
-              <a:t>Conclusion:</a:t>
-            </a:r>
-          </a:p>
-          <a:p>
-            <a:pPr lvl="1"/>
-            <a:r>
-              <a:rPr lang="en-US" sz="1300" b="1" dirty="0" smtClean="0"/>
-              <a:t>I can confirm that there are in fact “advanced statistics” can act as predictors for making the playoffs.</a:t>
-            </a:r>
-          </a:p>
-          <a:p>
-            <a:pPr lvl="1"/>
-            <a:r>
-              <a:rPr lang="en-US" sz="1300" b="1" dirty="0" smtClean="0"/>
-              <a:t>Fenwick and PDO are the best predictors.</a:t>
-            </a:r>
-          </a:p>
-          <a:p>
-            <a:endParaRPr lang="en-US" sz="1800" dirty="0" smtClean="0"/>
-          </a:p>
-          <a:p>
-            <a:endParaRPr lang="en-US" sz="1800" dirty="0" smtClean="0"/>
-          </a:p>
-        </p:txBody>
-      </p:sp>
-    </p:spTree>
-    <p:extLst>
-      <p:ext uri="{BB962C8B-B14F-4D97-AF65-F5344CB8AC3E}">
-        <p14:creationId xmlns:p14="http://schemas.microsoft.com/office/powerpoint/2010/main" val="417165197"/>
       </p:ext>
     </p:extLst>
   </p:cSld>
@@ -7602,6 +7913,129 @@
           <a:p>
             <a:r>
               <a:rPr lang="en-US" dirty="0" smtClean="0"/>
+              <a:t>Results Retrospective</a:t>
+            </a:r>
+            <a:endParaRPr lang="en-US" dirty="0"/>
+          </a:p>
+        </p:txBody>
+      </p:sp>
+      <p:sp>
+        <p:nvSpPr>
+          <p:cNvPr id="5" name="Content Placeholder 2"/>
+          <p:cNvSpPr>
+            <a:spLocks noGrp="1"/>
+          </p:cNvSpPr>
+          <p:nvPr>
+            <p:ph sz="quarter" idx="1"/>
+          </p:nvPr>
+        </p:nvSpPr>
+        <p:spPr>
+          <a:xfrm>
+            <a:off x="513410" y="1791030"/>
+            <a:ext cx="8131974" cy="4572000"/>
+          </a:xfrm>
+        </p:spPr>
+        <p:txBody>
+          <a:bodyPr rIns="457200">
+            <a:normAutofit/>
+          </a:bodyPr>
+          <a:lstStyle/>
+          <a:p>
+            <a:r>
+              <a:rPr lang="en-US" sz="1800" dirty="0" smtClean="0"/>
+              <a:t>The results were better than I expected given the relatively small sample size.</a:t>
+            </a:r>
+          </a:p>
+          <a:p>
+            <a:r>
+              <a:rPr lang="en-US" sz="1800" dirty="0" smtClean="0"/>
+              <a:t>The decision tree model is easier to understand, however it does not make a definite binary conclusion on the data.</a:t>
+            </a:r>
+          </a:p>
+          <a:p>
+            <a:r>
+              <a:rPr lang="en-US" sz="1800" dirty="0" smtClean="0"/>
+              <a:t>The ROC Curve shows the better than average results compared with random chance.</a:t>
+            </a:r>
+          </a:p>
+          <a:p>
+            <a:endParaRPr lang="en-US" sz="1800" dirty="0"/>
+          </a:p>
+          <a:p>
+            <a:r>
+              <a:rPr lang="en-US" sz="1800" b="1" dirty="0" smtClean="0"/>
+              <a:t>Conclusion:</a:t>
+            </a:r>
+          </a:p>
+          <a:p>
+            <a:pPr lvl="1"/>
+            <a:r>
+              <a:rPr lang="en-US" sz="1300" b="1" dirty="0" smtClean="0"/>
+              <a:t>I can confirm that there are in fact “advanced statistics” can act as predictors for making the playoffs.</a:t>
+            </a:r>
+          </a:p>
+          <a:p>
+            <a:pPr lvl="1"/>
+            <a:r>
+              <a:rPr lang="en-US" sz="1300" b="1" dirty="0" smtClean="0"/>
+              <a:t>Fenwick and PDO are the best predictors.</a:t>
+            </a:r>
+          </a:p>
+          <a:p>
+            <a:endParaRPr lang="en-US" sz="1800" dirty="0" smtClean="0"/>
+          </a:p>
+          <a:p>
+            <a:endParaRPr lang="en-US" sz="1800" dirty="0" smtClean="0"/>
+          </a:p>
+        </p:txBody>
+      </p:sp>
+    </p:spTree>
+    <p:extLst>
+      <p:ext uri="{BB962C8B-B14F-4D97-AF65-F5344CB8AC3E}">
+        <p14:creationId xmlns:p14="http://schemas.microsoft.com/office/powerpoint/2010/main" val="417165197"/>
+      </p:ext>
+    </p:extLst>
+  </p:cSld>
+  <p:clrMapOvr>
+    <a:masterClrMapping/>
+  </p:clrMapOvr>
+</p:sld>
+</file>
+
+<file path=ppt/slides/slide16.xml><?xml version="1.0" encoding="utf-8"?>
+<p:sld xmlns:a="http://schemas.openxmlformats.org/drawingml/2006/main" xmlns:r="http://schemas.openxmlformats.org/officeDocument/2006/relationships" xmlns:p="http://schemas.openxmlformats.org/presentationml/2006/main">
+  <p:cSld>
+    <p:spTree>
+      <p:nvGrpSpPr>
+        <p:cNvPr id="1" name=""/>
+        <p:cNvGrpSpPr/>
+        <p:nvPr/>
+      </p:nvGrpSpPr>
+      <p:grpSpPr>
+        <a:xfrm>
+          <a:off x="0" y="0"/>
+          <a:ext cx="0" cy="0"/>
+          <a:chOff x="0" y="0"/>
+          <a:chExt cx="0" cy="0"/>
+        </a:xfrm>
+      </p:grpSpPr>
+      <p:sp>
+        <p:nvSpPr>
+          <p:cNvPr id="2" name="Title 1"/>
+          <p:cNvSpPr>
+            <a:spLocks noGrp="1"/>
+          </p:cNvSpPr>
+          <p:nvPr>
+            <p:ph type="title"/>
+          </p:nvPr>
+        </p:nvSpPr>
+        <p:spPr/>
+        <p:txBody>
+          <a:bodyPr/>
+          <a:lstStyle/>
+          <a:p>
+            <a:r>
+              <a:rPr lang="en-US" dirty="0" smtClean="0"/>
               <a:t>Conclusions Using Current Season</a:t>
             </a:r>
             <a:endParaRPr lang="en-US" dirty="0"/>
@@ -8794,6 +9228,1087 @@
     <p:extLst>
       <p:ext uri="{BB962C8B-B14F-4D97-AF65-F5344CB8AC3E}">
         <p14:creationId xmlns:p14="http://schemas.microsoft.com/office/powerpoint/2010/main" val="4165566901"/>
+      </p:ext>
+    </p:extLst>
+  </p:cSld>
+  <p:clrMapOvr>
+    <a:masterClrMapping/>
+  </p:clrMapOvr>
+</p:sld>
+</file>
+
+<file path=ppt/slides/slide17.xml><?xml version="1.0" encoding="utf-8"?>
+<p:sld xmlns:a="http://schemas.openxmlformats.org/drawingml/2006/main" xmlns:r="http://schemas.openxmlformats.org/officeDocument/2006/relationships" xmlns:p="http://schemas.openxmlformats.org/presentationml/2006/main">
+  <p:cSld>
+    <p:spTree>
+      <p:nvGrpSpPr>
+        <p:cNvPr id="1" name=""/>
+        <p:cNvGrpSpPr/>
+        <p:nvPr/>
+      </p:nvGrpSpPr>
+      <p:grpSpPr>
+        <a:xfrm>
+          <a:off x="0" y="0"/>
+          <a:ext cx="0" cy="0"/>
+          <a:chOff x="0" y="0"/>
+          <a:chExt cx="0" cy="0"/>
+        </a:xfrm>
+      </p:grpSpPr>
+      <p:sp>
+        <p:nvSpPr>
+          <p:cNvPr id="2" name="Title 1"/>
+          <p:cNvSpPr>
+            <a:spLocks noGrp="1"/>
+          </p:cNvSpPr>
+          <p:nvPr>
+            <p:ph type="title"/>
+          </p:nvPr>
+        </p:nvSpPr>
+        <p:spPr/>
+        <p:txBody>
+          <a:bodyPr/>
+          <a:lstStyle/>
+          <a:p>
+            <a:r>
+              <a:rPr lang="en-US" dirty="0" smtClean="0"/>
+              <a:t>Next Steps</a:t>
+            </a:r>
+            <a:endParaRPr lang="en-US" dirty="0"/>
+          </a:p>
+        </p:txBody>
+      </p:sp>
+      <p:sp>
+        <p:nvSpPr>
+          <p:cNvPr id="4" name="Content Placeholder 2"/>
+          <p:cNvSpPr txBox="1">
+            <a:spLocks/>
+          </p:cNvSpPr>
+          <p:nvPr/>
+        </p:nvSpPr>
+        <p:spPr>
+          <a:xfrm>
+            <a:off x="665810" y="1638960"/>
+            <a:ext cx="3969690" cy="4572000"/>
+          </a:xfrm>
+          <a:prstGeom prst="rect">
+            <a:avLst/>
+          </a:prstGeom>
+        </p:spPr>
+        <p:txBody>
+          <a:bodyPr vert="horz" rIns="457200">
+            <a:noAutofit/>
+          </a:bodyPr>
+          <a:lstStyle>
+            <a:lvl1pPr marL="274320" indent="-274320" algn="l" rtl="0" eaLnBrk="1" latinLnBrk="0" hangingPunct="1">
+              <a:spcBef>
+                <a:spcPct val="20000"/>
+              </a:spcBef>
+              <a:buClr>
+                <a:schemeClr val="accent1"/>
+              </a:buClr>
+              <a:buSzPct val="85000"/>
+              <a:buFont typeface="Wingdings 2"/>
+              <a:buChar char=""/>
+              <a:defRPr kumimoji="0" sz="2700" kern="1200">
+                <a:solidFill>
+                  <a:schemeClr val="tx1"/>
+                </a:solidFill>
+                <a:latin typeface="+mn-lt"/>
+                <a:ea typeface="+mn-ea"/>
+                <a:cs typeface="+mn-cs"/>
+              </a:defRPr>
+            </a:lvl1pPr>
+            <a:lvl2pPr marL="548640" indent="-274320" algn="l" rtl="0" eaLnBrk="1" latinLnBrk="0" hangingPunct="1">
+              <a:spcBef>
+                <a:spcPct val="20000"/>
+              </a:spcBef>
+              <a:buClr>
+                <a:schemeClr val="accent2"/>
+              </a:buClr>
+              <a:buSzPct val="70000"/>
+              <a:buFont typeface="Wingdings"/>
+              <a:buChar char=""/>
+              <a:defRPr kumimoji="0" sz="2200" kern="1200">
+                <a:solidFill>
+                  <a:schemeClr val="tx2"/>
+                </a:solidFill>
+                <a:latin typeface="+mn-lt"/>
+                <a:ea typeface="+mn-ea"/>
+                <a:cs typeface="+mn-cs"/>
+              </a:defRPr>
+            </a:lvl2pPr>
+            <a:lvl3pPr marL="822960" indent="-228600" algn="l" rtl="0" eaLnBrk="1" latinLnBrk="0" hangingPunct="1">
+              <a:spcBef>
+                <a:spcPct val="20000"/>
+              </a:spcBef>
+              <a:buClr>
+                <a:schemeClr val="accent3"/>
+              </a:buClr>
+              <a:buSzPct val="75000"/>
+              <a:buFont typeface="Wingdings 2"/>
+              <a:buChar char=""/>
+              <a:defRPr kumimoji="0" sz="2000" kern="1200">
+                <a:solidFill>
+                  <a:schemeClr val="tx1"/>
+                </a:solidFill>
+                <a:latin typeface="+mn-lt"/>
+                <a:ea typeface="+mn-ea"/>
+                <a:cs typeface="+mn-cs"/>
+              </a:defRPr>
+            </a:lvl3pPr>
+            <a:lvl4pPr marL="1097280" indent="-228600" algn="l" rtl="0" eaLnBrk="1" latinLnBrk="0" hangingPunct="1">
+              <a:spcBef>
+                <a:spcPct val="20000"/>
+              </a:spcBef>
+              <a:buClr>
+                <a:schemeClr val="accent4"/>
+              </a:buClr>
+              <a:buSzPct val="70000"/>
+              <a:buFont typeface="Wingdings"/>
+              <a:buChar char=""/>
+              <a:defRPr kumimoji="0" sz="2000" kern="1200">
+                <a:solidFill>
+                  <a:schemeClr val="tx2"/>
+                </a:solidFill>
+                <a:latin typeface="+mn-lt"/>
+                <a:ea typeface="+mn-ea"/>
+                <a:cs typeface="+mn-cs"/>
+              </a:defRPr>
+            </a:lvl4pPr>
+            <a:lvl5pPr marL="1371600" indent="-228600" algn="l" rtl="0" eaLnBrk="1" latinLnBrk="0" hangingPunct="1">
+              <a:spcBef>
+                <a:spcPct val="20000"/>
+              </a:spcBef>
+              <a:buClr>
+                <a:schemeClr val="accent5"/>
+              </a:buClr>
+              <a:buFontTx/>
+              <a:buChar char="•"/>
+              <a:defRPr kumimoji="0" sz="1800" kern="1200">
+                <a:solidFill>
+                  <a:schemeClr val="tx1"/>
+                </a:solidFill>
+                <a:latin typeface="+mn-lt"/>
+                <a:ea typeface="+mn-ea"/>
+                <a:cs typeface="+mn-cs"/>
+              </a:defRPr>
+            </a:lvl5pPr>
+            <a:lvl6pPr marL="1645920" indent="-182880" algn="l" rtl="0" eaLnBrk="1" latinLnBrk="0" hangingPunct="1">
+              <a:spcBef>
+                <a:spcPct val="20000"/>
+              </a:spcBef>
+              <a:buClr>
+                <a:schemeClr val="accent6"/>
+              </a:buClr>
+              <a:buSzPct val="80000"/>
+              <a:buFont typeface="Wingdings 2"/>
+              <a:buChar char=""/>
+              <a:defRPr kumimoji="0" sz="1800" kern="1200">
+                <a:solidFill>
+                  <a:schemeClr val="tx1"/>
+                </a:solidFill>
+                <a:latin typeface="+mn-lt"/>
+                <a:ea typeface="+mn-ea"/>
+                <a:cs typeface="+mn-cs"/>
+              </a:defRPr>
+            </a:lvl6pPr>
+            <a:lvl7pPr marL="1920240" indent="-182880" algn="l" rtl="0" eaLnBrk="1" latinLnBrk="0" hangingPunct="1">
+              <a:spcBef>
+                <a:spcPct val="20000"/>
+              </a:spcBef>
+              <a:buClr>
+                <a:schemeClr val="accent1">
+                  <a:shade val="75000"/>
+                </a:schemeClr>
+              </a:buClr>
+              <a:buSzPct val="90000"/>
+              <a:buChar char="•"/>
+              <a:defRPr kumimoji="0" sz="1600" kern="1200" baseline="0">
+                <a:solidFill>
+                  <a:schemeClr val="tx1"/>
+                </a:solidFill>
+                <a:latin typeface="+mn-lt"/>
+                <a:ea typeface="+mn-ea"/>
+                <a:cs typeface="+mn-cs"/>
+              </a:defRPr>
+            </a:lvl7pPr>
+            <a:lvl8pPr marL="2103120" indent="-182880" algn="l" rtl="0" eaLnBrk="1" latinLnBrk="0" hangingPunct="1">
+              <a:spcBef>
+                <a:spcPct val="20000"/>
+              </a:spcBef>
+              <a:buClr>
+                <a:schemeClr val="accent4">
+                  <a:shade val="75000"/>
+                </a:schemeClr>
+              </a:buClr>
+              <a:buChar char="•"/>
+              <a:defRPr kumimoji="0" sz="1600" kern="1200">
+                <a:solidFill>
+                  <a:schemeClr val="tx1"/>
+                </a:solidFill>
+                <a:latin typeface="+mn-lt"/>
+                <a:ea typeface="+mn-ea"/>
+                <a:cs typeface="+mn-cs"/>
+              </a:defRPr>
+            </a:lvl8pPr>
+            <a:lvl9pPr marL="2377440" indent="-182880" algn="l" rtl="0" eaLnBrk="1" latinLnBrk="0" hangingPunct="1">
+              <a:spcBef>
+                <a:spcPct val="20000"/>
+              </a:spcBef>
+              <a:buClr>
+                <a:schemeClr val="accent2">
+                  <a:shade val="75000"/>
+                </a:schemeClr>
+              </a:buClr>
+              <a:buSzPct val="90000"/>
+              <a:buChar char="•"/>
+              <a:defRPr kumimoji="0" sz="1400" kern="1200" cap="all" baseline="0">
+                <a:solidFill>
+                  <a:schemeClr val="tx1"/>
+                </a:solidFill>
+                <a:latin typeface="+mn-lt"/>
+                <a:ea typeface="+mn-ea"/>
+                <a:cs typeface="+mn-cs"/>
+              </a:defRPr>
+            </a:lvl9pPr>
+          </a:lstStyle>
+          <a:p>
+            <a:r>
+              <a:rPr lang="en-US" sz="1600" dirty="0" smtClean="0"/>
+              <a:t>Next Steps would be to utilize an even larger feature set to find the right balance between advanced stats and traditional statistics.</a:t>
+            </a:r>
+          </a:p>
+          <a:p>
+            <a:r>
+              <a:rPr lang="en-US" sz="1600" dirty="0" smtClean="0"/>
+              <a:t>Instead of looking at total season statistics, use a set of individual game data to predict the outcome of the next game to be played and thus long term win/loss records</a:t>
+            </a:r>
+          </a:p>
+          <a:p>
+            <a:r>
+              <a:rPr lang="en-US" sz="1600" dirty="0" smtClean="0"/>
+              <a:t>See what features are most important to predict player success or where player success and team success are correlated.</a:t>
+            </a:r>
+          </a:p>
+          <a:p>
+            <a:r>
+              <a:rPr lang="en-US" sz="1600" dirty="0" smtClean="0"/>
+              <a:t>Publish report on web and seek response from community.</a:t>
+            </a:r>
+            <a:endParaRPr lang="en-US" sz="1600" dirty="0" smtClean="0"/>
+          </a:p>
+        </p:txBody>
+      </p:sp>
+      <p:sp>
+        <p:nvSpPr>
+          <p:cNvPr id="6" name="Content Placeholder 2"/>
+          <p:cNvSpPr txBox="1">
+            <a:spLocks/>
+          </p:cNvSpPr>
+          <p:nvPr/>
+        </p:nvSpPr>
+        <p:spPr>
+          <a:xfrm>
+            <a:off x="3358210" y="1778660"/>
+            <a:ext cx="4122090" cy="4572000"/>
+          </a:xfrm>
+          <a:prstGeom prst="rect">
+            <a:avLst/>
+          </a:prstGeom>
+        </p:spPr>
+        <p:txBody>
+          <a:bodyPr vert="horz" rIns="457200">
+            <a:normAutofit/>
+          </a:bodyPr>
+          <a:lstStyle>
+            <a:lvl1pPr marL="274320" indent="-274320" algn="l" rtl="0" eaLnBrk="1" latinLnBrk="0" hangingPunct="1">
+              <a:spcBef>
+                <a:spcPct val="20000"/>
+              </a:spcBef>
+              <a:buClr>
+                <a:schemeClr val="accent1"/>
+              </a:buClr>
+              <a:buSzPct val="85000"/>
+              <a:buFont typeface="Wingdings 2"/>
+              <a:buChar char=""/>
+              <a:defRPr kumimoji="0" sz="2700" kern="1200">
+                <a:solidFill>
+                  <a:schemeClr val="tx1"/>
+                </a:solidFill>
+                <a:latin typeface="+mn-lt"/>
+                <a:ea typeface="+mn-ea"/>
+                <a:cs typeface="+mn-cs"/>
+              </a:defRPr>
+            </a:lvl1pPr>
+            <a:lvl2pPr marL="548640" indent="-274320" algn="l" rtl="0" eaLnBrk="1" latinLnBrk="0" hangingPunct="1">
+              <a:spcBef>
+                <a:spcPct val="20000"/>
+              </a:spcBef>
+              <a:buClr>
+                <a:schemeClr val="accent2"/>
+              </a:buClr>
+              <a:buSzPct val="70000"/>
+              <a:buFont typeface="Wingdings"/>
+              <a:buChar char=""/>
+              <a:defRPr kumimoji="0" sz="2200" kern="1200">
+                <a:solidFill>
+                  <a:schemeClr val="tx2"/>
+                </a:solidFill>
+                <a:latin typeface="+mn-lt"/>
+                <a:ea typeface="+mn-ea"/>
+                <a:cs typeface="+mn-cs"/>
+              </a:defRPr>
+            </a:lvl2pPr>
+            <a:lvl3pPr marL="822960" indent="-228600" algn="l" rtl="0" eaLnBrk="1" latinLnBrk="0" hangingPunct="1">
+              <a:spcBef>
+                <a:spcPct val="20000"/>
+              </a:spcBef>
+              <a:buClr>
+                <a:schemeClr val="accent3"/>
+              </a:buClr>
+              <a:buSzPct val="75000"/>
+              <a:buFont typeface="Wingdings 2"/>
+              <a:buChar char=""/>
+              <a:defRPr kumimoji="0" sz="2000" kern="1200">
+                <a:solidFill>
+                  <a:schemeClr val="tx1"/>
+                </a:solidFill>
+                <a:latin typeface="+mn-lt"/>
+                <a:ea typeface="+mn-ea"/>
+                <a:cs typeface="+mn-cs"/>
+              </a:defRPr>
+            </a:lvl3pPr>
+            <a:lvl4pPr marL="1097280" indent="-228600" algn="l" rtl="0" eaLnBrk="1" latinLnBrk="0" hangingPunct="1">
+              <a:spcBef>
+                <a:spcPct val="20000"/>
+              </a:spcBef>
+              <a:buClr>
+                <a:schemeClr val="accent4"/>
+              </a:buClr>
+              <a:buSzPct val="70000"/>
+              <a:buFont typeface="Wingdings"/>
+              <a:buChar char=""/>
+              <a:defRPr kumimoji="0" sz="2000" kern="1200">
+                <a:solidFill>
+                  <a:schemeClr val="tx2"/>
+                </a:solidFill>
+                <a:latin typeface="+mn-lt"/>
+                <a:ea typeface="+mn-ea"/>
+                <a:cs typeface="+mn-cs"/>
+              </a:defRPr>
+            </a:lvl4pPr>
+            <a:lvl5pPr marL="1371600" indent="-228600" algn="l" rtl="0" eaLnBrk="1" latinLnBrk="0" hangingPunct="1">
+              <a:spcBef>
+                <a:spcPct val="20000"/>
+              </a:spcBef>
+              <a:buClr>
+                <a:schemeClr val="accent5"/>
+              </a:buClr>
+              <a:buFontTx/>
+              <a:buChar char="•"/>
+              <a:defRPr kumimoji="0" sz="1800" kern="1200">
+                <a:solidFill>
+                  <a:schemeClr val="tx1"/>
+                </a:solidFill>
+                <a:latin typeface="+mn-lt"/>
+                <a:ea typeface="+mn-ea"/>
+                <a:cs typeface="+mn-cs"/>
+              </a:defRPr>
+            </a:lvl5pPr>
+            <a:lvl6pPr marL="1645920" indent="-182880" algn="l" rtl="0" eaLnBrk="1" latinLnBrk="0" hangingPunct="1">
+              <a:spcBef>
+                <a:spcPct val="20000"/>
+              </a:spcBef>
+              <a:buClr>
+                <a:schemeClr val="accent6"/>
+              </a:buClr>
+              <a:buSzPct val="80000"/>
+              <a:buFont typeface="Wingdings 2"/>
+              <a:buChar char=""/>
+              <a:defRPr kumimoji="0" sz="1800" kern="1200">
+                <a:solidFill>
+                  <a:schemeClr val="tx1"/>
+                </a:solidFill>
+                <a:latin typeface="+mn-lt"/>
+                <a:ea typeface="+mn-ea"/>
+                <a:cs typeface="+mn-cs"/>
+              </a:defRPr>
+            </a:lvl6pPr>
+            <a:lvl7pPr marL="1920240" indent="-182880" algn="l" rtl="0" eaLnBrk="1" latinLnBrk="0" hangingPunct="1">
+              <a:spcBef>
+                <a:spcPct val="20000"/>
+              </a:spcBef>
+              <a:buClr>
+                <a:schemeClr val="accent1">
+                  <a:shade val="75000"/>
+                </a:schemeClr>
+              </a:buClr>
+              <a:buSzPct val="90000"/>
+              <a:buChar char="•"/>
+              <a:defRPr kumimoji="0" sz="1600" kern="1200" baseline="0">
+                <a:solidFill>
+                  <a:schemeClr val="tx1"/>
+                </a:solidFill>
+                <a:latin typeface="+mn-lt"/>
+                <a:ea typeface="+mn-ea"/>
+                <a:cs typeface="+mn-cs"/>
+              </a:defRPr>
+            </a:lvl7pPr>
+            <a:lvl8pPr marL="2103120" indent="-182880" algn="l" rtl="0" eaLnBrk="1" latinLnBrk="0" hangingPunct="1">
+              <a:spcBef>
+                <a:spcPct val="20000"/>
+              </a:spcBef>
+              <a:buClr>
+                <a:schemeClr val="accent4">
+                  <a:shade val="75000"/>
+                </a:schemeClr>
+              </a:buClr>
+              <a:buChar char="•"/>
+              <a:defRPr kumimoji="0" sz="1600" kern="1200">
+                <a:solidFill>
+                  <a:schemeClr val="tx1"/>
+                </a:solidFill>
+                <a:latin typeface="+mn-lt"/>
+                <a:ea typeface="+mn-ea"/>
+                <a:cs typeface="+mn-cs"/>
+              </a:defRPr>
+            </a:lvl8pPr>
+            <a:lvl9pPr marL="2377440" indent="-182880" algn="l" rtl="0" eaLnBrk="1" latinLnBrk="0" hangingPunct="1">
+              <a:spcBef>
+                <a:spcPct val="20000"/>
+              </a:spcBef>
+              <a:buClr>
+                <a:schemeClr val="accent2">
+                  <a:shade val="75000"/>
+                </a:schemeClr>
+              </a:buClr>
+              <a:buSzPct val="90000"/>
+              <a:buChar char="•"/>
+              <a:defRPr kumimoji="0" sz="1400" kern="1200" cap="all" baseline="0">
+                <a:solidFill>
+                  <a:schemeClr val="tx1"/>
+                </a:solidFill>
+                <a:latin typeface="+mn-lt"/>
+                <a:ea typeface="+mn-ea"/>
+                <a:cs typeface="+mn-cs"/>
+              </a:defRPr>
+            </a:lvl9pPr>
+          </a:lstStyle>
+          <a:p>
+            <a:endParaRPr lang="en-US" sz="1800" smtClean="0"/>
+          </a:p>
+          <a:p>
+            <a:endParaRPr lang="en-US" sz="1800" dirty="0" smtClean="0"/>
+          </a:p>
+        </p:txBody>
+      </p:sp>
+      <p:pic>
+        <p:nvPicPr>
+          <p:cNvPr id="5" name="Picture 4"/>
+          <p:cNvPicPr>
+            <a:picLocks noChangeAspect="1"/>
+          </p:cNvPicPr>
+          <p:nvPr/>
+        </p:nvPicPr>
+        <p:blipFill>
+          <a:blip r:embed="rId2"/>
+          <a:stretch>
+            <a:fillRect/>
+          </a:stretch>
+        </p:blipFill>
+        <p:spPr>
+          <a:xfrm>
+            <a:off x="4272917" y="1778660"/>
+            <a:ext cx="2438400" cy="2438400"/>
+          </a:xfrm>
+          <a:prstGeom prst="rect">
+            <a:avLst/>
+          </a:prstGeom>
+        </p:spPr>
+      </p:pic>
+      <p:pic>
+        <p:nvPicPr>
+          <p:cNvPr id="8" name="Picture 7"/>
+          <p:cNvPicPr>
+            <a:picLocks noChangeAspect="1"/>
+          </p:cNvPicPr>
+          <p:nvPr/>
+        </p:nvPicPr>
+        <p:blipFill>
+          <a:blip r:embed="rId3"/>
+          <a:stretch>
+            <a:fillRect/>
+          </a:stretch>
+        </p:blipFill>
+        <p:spPr>
+          <a:xfrm>
+            <a:off x="4272917" y="5226380"/>
+            <a:ext cx="4388483" cy="470560"/>
+          </a:xfrm>
+          <a:prstGeom prst="rect">
+            <a:avLst/>
+          </a:prstGeom>
+        </p:spPr>
+      </p:pic>
+      <p:pic>
+        <p:nvPicPr>
+          <p:cNvPr id="10" name="Picture 9"/>
+          <p:cNvPicPr>
+            <a:picLocks noChangeAspect="1"/>
+          </p:cNvPicPr>
+          <p:nvPr/>
+        </p:nvPicPr>
+        <p:blipFill>
+          <a:blip r:embed="rId4"/>
+          <a:stretch>
+            <a:fillRect/>
+          </a:stretch>
+        </p:blipFill>
+        <p:spPr>
+          <a:xfrm>
+            <a:off x="4635500" y="4394200"/>
+            <a:ext cx="3860800" cy="647700"/>
+          </a:xfrm>
+          <a:prstGeom prst="rect">
+            <a:avLst/>
+          </a:prstGeom>
+        </p:spPr>
+      </p:pic>
+      <p:pic>
+        <p:nvPicPr>
+          <p:cNvPr id="11" name="Picture 10"/>
+          <p:cNvPicPr>
+            <a:picLocks noChangeAspect="1"/>
+          </p:cNvPicPr>
+          <p:nvPr/>
+        </p:nvPicPr>
+        <p:blipFill>
+          <a:blip r:embed="rId5"/>
+          <a:stretch>
+            <a:fillRect/>
+          </a:stretch>
+        </p:blipFill>
+        <p:spPr>
+          <a:xfrm>
+            <a:off x="6915316" y="1638960"/>
+            <a:ext cx="1844636" cy="2298700"/>
+          </a:xfrm>
+          <a:prstGeom prst="rect">
+            <a:avLst/>
+          </a:prstGeom>
+        </p:spPr>
+      </p:pic>
+    </p:spTree>
+    <p:extLst>
+      <p:ext uri="{BB962C8B-B14F-4D97-AF65-F5344CB8AC3E}">
+        <p14:creationId xmlns:p14="http://schemas.microsoft.com/office/powerpoint/2010/main" val="1943339826"/>
+      </p:ext>
+    </p:extLst>
+  </p:cSld>
+  <p:clrMapOvr>
+    <a:masterClrMapping/>
+  </p:clrMapOvr>
+</p:sld>
+</file>
+
+<file path=ppt/slides/slide18.xml><?xml version="1.0" encoding="utf-8"?>
+<p:sld xmlns:a="http://schemas.openxmlformats.org/drawingml/2006/main" xmlns:r="http://schemas.openxmlformats.org/officeDocument/2006/relationships" xmlns:p="http://schemas.openxmlformats.org/presentationml/2006/main">
+  <p:cSld>
+    <p:spTree>
+      <p:nvGrpSpPr>
+        <p:cNvPr id="1" name=""/>
+        <p:cNvGrpSpPr/>
+        <p:nvPr/>
+      </p:nvGrpSpPr>
+      <p:grpSpPr>
+        <a:xfrm>
+          <a:off x="0" y="0"/>
+          <a:ext cx="0" cy="0"/>
+          <a:chOff x="0" y="0"/>
+          <a:chExt cx="0" cy="0"/>
+        </a:xfrm>
+      </p:grpSpPr>
+      <p:sp>
+        <p:nvSpPr>
+          <p:cNvPr id="2" name="Title 1"/>
+          <p:cNvSpPr>
+            <a:spLocks noGrp="1"/>
+          </p:cNvSpPr>
+          <p:nvPr>
+            <p:ph type="title"/>
+          </p:nvPr>
+        </p:nvSpPr>
+        <p:spPr/>
+        <p:txBody>
+          <a:bodyPr/>
+          <a:lstStyle/>
+          <a:p>
+            <a:r>
+              <a:rPr lang="en-US" dirty="0" smtClean="0"/>
+              <a:t>Appendix</a:t>
+            </a:r>
+            <a:endParaRPr lang="en-US" dirty="0"/>
+          </a:p>
+        </p:txBody>
+      </p:sp>
+      <p:sp>
+        <p:nvSpPr>
+          <p:cNvPr id="4" name="Content Placeholder 2"/>
+          <p:cNvSpPr txBox="1">
+            <a:spLocks/>
+          </p:cNvSpPr>
+          <p:nvPr/>
+        </p:nvSpPr>
+        <p:spPr>
+          <a:xfrm>
+            <a:off x="665810" y="1638960"/>
+            <a:ext cx="8170342" cy="4572000"/>
+          </a:xfrm>
+          <a:prstGeom prst="rect">
+            <a:avLst/>
+          </a:prstGeom>
+        </p:spPr>
+        <p:txBody>
+          <a:bodyPr vert="horz" rIns="457200">
+            <a:noAutofit/>
+          </a:bodyPr>
+          <a:lstStyle>
+            <a:lvl1pPr marL="274320" indent="-274320" algn="l" rtl="0" eaLnBrk="1" latinLnBrk="0" hangingPunct="1">
+              <a:spcBef>
+                <a:spcPct val="20000"/>
+              </a:spcBef>
+              <a:buClr>
+                <a:schemeClr val="accent1"/>
+              </a:buClr>
+              <a:buSzPct val="85000"/>
+              <a:buFont typeface="Wingdings 2"/>
+              <a:buChar char=""/>
+              <a:defRPr kumimoji="0" sz="2700" kern="1200">
+                <a:solidFill>
+                  <a:schemeClr val="tx1"/>
+                </a:solidFill>
+                <a:latin typeface="+mn-lt"/>
+                <a:ea typeface="+mn-ea"/>
+                <a:cs typeface="+mn-cs"/>
+              </a:defRPr>
+            </a:lvl1pPr>
+            <a:lvl2pPr marL="548640" indent="-274320" algn="l" rtl="0" eaLnBrk="1" latinLnBrk="0" hangingPunct="1">
+              <a:spcBef>
+                <a:spcPct val="20000"/>
+              </a:spcBef>
+              <a:buClr>
+                <a:schemeClr val="accent2"/>
+              </a:buClr>
+              <a:buSzPct val="70000"/>
+              <a:buFont typeface="Wingdings"/>
+              <a:buChar char=""/>
+              <a:defRPr kumimoji="0" sz="2200" kern="1200">
+                <a:solidFill>
+                  <a:schemeClr val="tx2"/>
+                </a:solidFill>
+                <a:latin typeface="+mn-lt"/>
+                <a:ea typeface="+mn-ea"/>
+                <a:cs typeface="+mn-cs"/>
+              </a:defRPr>
+            </a:lvl2pPr>
+            <a:lvl3pPr marL="822960" indent="-228600" algn="l" rtl="0" eaLnBrk="1" latinLnBrk="0" hangingPunct="1">
+              <a:spcBef>
+                <a:spcPct val="20000"/>
+              </a:spcBef>
+              <a:buClr>
+                <a:schemeClr val="accent3"/>
+              </a:buClr>
+              <a:buSzPct val="75000"/>
+              <a:buFont typeface="Wingdings 2"/>
+              <a:buChar char=""/>
+              <a:defRPr kumimoji="0" sz="2000" kern="1200">
+                <a:solidFill>
+                  <a:schemeClr val="tx1"/>
+                </a:solidFill>
+                <a:latin typeface="+mn-lt"/>
+                <a:ea typeface="+mn-ea"/>
+                <a:cs typeface="+mn-cs"/>
+              </a:defRPr>
+            </a:lvl3pPr>
+            <a:lvl4pPr marL="1097280" indent="-228600" algn="l" rtl="0" eaLnBrk="1" latinLnBrk="0" hangingPunct="1">
+              <a:spcBef>
+                <a:spcPct val="20000"/>
+              </a:spcBef>
+              <a:buClr>
+                <a:schemeClr val="accent4"/>
+              </a:buClr>
+              <a:buSzPct val="70000"/>
+              <a:buFont typeface="Wingdings"/>
+              <a:buChar char=""/>
+              <a:defRPr kumimoji="0" sz="2000" kern="1200">
+                <a:solidFill>
+                  <a:schemeClr val="tx2"/>
+                </a:solidFill>
+                <a:latin typeface="+mn-lt"/>
+                <a:ea typeface="+mn-ea"/>
+                <a:cs typeface="+mn-cs"/>
+              </a:defRPr>
+            </a:lvl4pPr>
+            <a:lvl5pPr marL="1371600" indent="-228600" algn="l" rtl="0" eaLnBrk="1" latinLnBrk="0" hangingPunct="1">
+              <a:spcBef>
+                <a:spcPct val="20000"/>
+              </a:spcBef>
+              <a:buClr>
+                <a:schemeClr val="accent5"/>
+              </a:buClr>
+              <a:buFontTx/>
+              <a:buChar char="•"/>
+              <a:defRPr kumimoji="0" sz="1800" kern="1200">
+                <a:solidFill>
+                  <a:schemeClr val="tx1"/>
+                </a:solidFill>
+                <a:latin typeface="+mn-lt"/>
+                <a:ea typeface="+mn-ea"/>
+                <a:cs typeface="+mn-cs"/>
+              </a:defRPr>
+            </a:lvl5pPr>
+            <a:lvl6pPr marL="1645920" indent="-182880" algn="l" rtl="0" eaLnBrk="1" latinLnBrk="0" hangingPunct="1">
+              <a:spcBef>
+                <a:spcPct val="20000"/>
+              </a:spcBef>
+              <a:buClr>
+                <a:schemeClr val="accent6"/>
+              </a:buClr>
+              <a:buSzPct val="80000"/>
+              <a:buFont typeface="Wingdings 2"/>
+              <a:buChar char=""/>
+              <a:defRPr kumimoji="0" sz="1800" kern="1200">
+                <a:solidFill>
+                  <a:schemeClr val="tx1"/>
+                </a:solidFill>
+                <a:latin typeface="+mn-lt"/>
+                <a:ea typeface="+mn-ea"/>
+                <a:cs typeface="+mn-cs"/>
+              </a:defRPr>
+            </a:lvl6pPr>
+            <a:lvl7pPr marL="1920240" indent="-182880" algn="l" rtl="0" eaLnBrk="1" latinLnBrk="0" hangingPunct="1">
+              <a:spcBef>
+                <a:spcPct val="20000"/>
+              </a:spcBef>
+              <a:buClr>
+                <a:schemeClr val="accent1">
+                  <a:shade val="75000"/>
+                </a:schemeClr>
+              </a:buClr>
+              <a:buSzPct val="90000"/>
+              <a:buChar char="•"/>
+              <a:defRPr kumimoji="0" sz="1600" kern="1200" baseline="0">
+                <a:solidFill>
+                  <a:schemeClr val="tx1"/>
+                </a:solidFill>
+                <a:latin typeface="+mn-lt"/>
+                <a:ea typeface="+mn-ea"/>
+                <a:cs typeface="+mn-cs"/>
+              </a:defRPr>
+            </a:lvl7pPr>
+            <a:lvl8pPr marL="2103120" indent="-182880" algn="l" rtl="0" eaLnBrk="1" latinLnBrk="0" hangingPunct="1">
+              <a:spcBef>
+                <a:spcPct val="20000"/>
+              </a:spcBef>
+              <a:buClr>
+                <a:schemeClr val="accent4">
+                  <a:shade val="75000"/>
+                </a:schemeClr>
+              </a:buClr>
+              <a:buChar char="•"/>
+              <a:defRPr kumimoji="0" sz="1600" kern="1200">
+                <a:solidFill>
+                  <a:schemeClr val="tx1"/>
+                </a:solidFill>
+                <a:latin typeface="+mn-lt"/>
+                <a:ea typeface="+mn-ea"/>
+                <a:cs typeface="+mn-cs"/>
+              </a:defRPr>
+            </a:lvl8pPr>
+            <a:lvl9pPr marL="2377440" indent="-182880" algn="l" rtl="0" eaLnBrk="1" latinLnBrk="0" hangingPunct="1">
+              <a:spcBef>
+                <a:spcPct val="20000"/>
+              </a:spcBef>
+              <a:buClr>
+                <a:schemeClr val="accent2">
+                  <a:shade val="75000"/>
+                </a:schemeClr>
+              </a:buClr>
+              <a:buSzPct val="90000"/>
+              <a:buChar char="•"/>
+              <a:defRPr kumimoji="0" sz="1400" kern="1200" cap="all" baseline="0">
+                <a:solidFill>
+                  <a:schemeClr val="tx1"/>
+                </a:solidFill>
+                <a:latin typeface="+mn-lt"/>
+                <a:ea typeface="+mn-ea"/>
+                <a:cs typeface="+mn-cs"/>
+              </a:defRPr>
+            </a:lvl9pPr>
+          </a:lstStyle>
+          <a:p>
+            <a:r>
+              <a:rPr lang="en-US" sz="2000" dirty="0" smtClean="0"/>
+              <a:t>All of th</a:t>
+            </a:r>
+            <a:r>
+              <a:rPr lang="en-US" sz="2000" dirty="0" smtClean="0"/>
+              <a:t>e technical information, </a:t>
+            </a:r>
+            <a:r>
+              <a:rPr lang="en-US" sz="2000" dirty="0" err="1" smtClean="0"/>
+              <a:t>Jupyter</a:t>
+            </a:r>
+            <a:r>
+              <a:rPr lang="en-US" sz="2000" dirty="0" smtClean="0"/>
+              <a:t> Notebooks and datasets can be found on my </a:t>
+            </a:r>
+            <a:r>
+              <a:rPr lang="en-US" sz="2000" dirty="0" err="1" smtClean="0"/>
+              <a:t>GitHub</a:t>
+            </a:r>
+            <a:r>
+              <a:rPr lang="en-US" sz="2000" dirty="0" smtClean="0"/>
+              <a:t>:</a:t>
+            </a:r>
+          </a:p>
+          <a:p>
+            <a:endParaRPr lang="en-US" sz="2000" dirty="0"/>
+          </a:p>
+          <a:p>
+            <a:pPr marL="0" indent="0">
+              <a:buNone/>
+            </a:pPr>
+            <a:r>
+              <a:rPr lang="en-US" sz="2000" dirty="0"/>
+              <a:t>https://</a:t>
+            </a:r>
+            <a:r>
+              <a:rPr lang="en-US" sz="2000" dirty="0" err="1"/>
+              <a:t>github.com</a:t>
+            </a:r>
+            <a:r>
+              <a:rPr lang="en-US" sz="2000" dirty="0"/>
+              <a:t>/themp731/Projects/tree/master/</a:t>
+            </a:r>
+            <a:r>
+              <a:rPr lang="en-US" sz="2000" dirty="0" err="1"/>
+              <a:t>Final_Data</a:t>
+            </a:r>
+            <a:endParaRPr lang="en-US" sz="2000" dirty="0" smtClean="0"/>
+          </a:p>
+          <a:p>
+            <a:endParaRPr lang="en-US" sz="2000" dirty="0" smtClean="0"/>
+          </a:p>
+        </p:txBody>
+      </p:sp>
+      <p:sp>
+        <p:nvSpPr>
+          <p:cNvPr id="6" name="Content Placeholder 2"/>
+          <p:cNvSpPr txBox="1">
+            <a:spLocks/>
+          </p:cNvSpPr>
+          <p:nvPr/>
+        </p:nvSpPr>
+        <p:spPr>
+          <a:xfrm>
+            <a:off x="3358210" y="1778660"/>
+            <a:ext cx="4122090" cy="4572000"/>
+          </a:xfrm>
+          <a:prstGeom prst="rect">
+            <a:avLst/>
+          </a:prstGeom>
+        </p:spPr>
+        <p:txBody>
+          <a:bodyPr vert="horz" rIns="457200">
+            <a:normAutofit/>
+          </a:bodyPr>
+          <a:lstStyle>
+            <a:lvl1pPr marL="274320" indent="-274320" algn="l" rtl="0" eaLnBrk="1" latinLnBrk="0" hangingPunct="1">
+              <a:spcBef>
+                <a:spcPct val="20000"/>
+              </a:spcBef>
+              <a:buClr>
+                <a:schemeClr val="accent1"/>
+              </a:buClr>
+              <a:buSzPct val="85000"/>
+              <a:buFont typeface="Wingdings 2"/>
+              <a:buChar char=""/>
+              <a:defRPr kumimoji="0" sz="2700" kern="1200">
+                <a:solidFill>
+                  <a:schemeClr val="tx1"/>
+                </a:solidFill>
+                <a:latin typeface="+mn-lt"/>
+                <a:ea typeface="+mn-ea"/>
+                <a:cs typeface="+mn-cs"/>
+              </a:defRPr>
+            </a:lvl1pPr>
+            <a:lvl2pPr marL="548640" indent="-274320" algn="l" rtl="0" eaLnBrk="1" latinLnBrk="0" hangingPunct="1">
+              <a:spcBef>
+                <a:spcPct val="20000"/>
+              </a:spcBef>
+              <a:buClr>
+                <a:schemeClr val="accent2"/>
+              </a:buClr>
+              <a:buSzPct val="70000"/>
+              <a:buFont typeface="Wingdings"/>
+              <a:buChar char=""/>
+              <a:defRPr kumimoji="0" sz="2200" kern="1200">
+                <a:solidFill>
+                  <a:schemeClr val="tx2"/>
+                </a:solidFill>
+                <a:latin typeface="+mn-lt"/>
+                <a:ea typeface="+mn-ea"/>
+                <a:cs typeface="+mn-cs"/>
+              </a:defRPr>
+            </a:lvl2pPr>
+            <a:lvl3pPr marL="822960" indent="-228600" algn="l" rtl="0" eaLnBrk="1" latinLnBrk="0" hangingPunct="1">
+              <a:spcBef>
+                <a:spcPct val="20000"/>
+              </a:spcBef>
+              <a:buClr>
+                <a:schemeClr val="accent3"/>
+              </a:buClr>
+              <a:buSzPct val="75000"/>
+              <a:buFont typeface="Wingdings 2"/>
+              <a:buChar char=""/>
+              <a:defRPr kumimoji="0" sz="2000" kern="1200">
+                <a:solidFill>
+                  <a:schemeClr val="tx1"/>
+                </a:solidFill>
+                <a:latin typeface="+mn-lt"/>
+                <a:ea typeface="+mn-ea"/>
+                <a:cs typeface="+mn-cs"/>
+              </a:defRPr>
+            </a:lvl3pPr>
+            <a:lvl4pPr marL="1097280" indent="-228600" algn="l" rtl="0" eaLnBrk="1" latinLnBrk="0" hangingPunct="1">
+              <a:spcBef>
+                <a:spcPct val="20000"/>
+              </a:spcBef>
+              <a:buClr>
+                <a:schemeClr val="accent4"/>
+              </a:buClr>
+              <a:buSzPct val="70000"/>
+              <a:buFont typeface="Wingdings"/>
+              <a:buChar char=""/>
+              <a:defRPr kumimoji="0" sz="2000" kern="1200">
+                <a:solidFill>
+                  <a:schemeClr val="tx2"/>
+                </a:solidFill>
+                <a:latin typeface="+mn-lt"/>
+                <a:ea typeface="+mn-ea"/>
+                <a:cs typeface="+mn-cs"/>
+              </a:defRPr>
+            </a:lvl4pPr>
+            <a:lvl5pPr marL="1371600" indent="-228600" algn="l" rtl="0" eaLnBrk="1" latinLnBrk="0" hangingPunct="1">
+              <a:spcBef>
+                <a:spcPct val="20000"/>
+              </a:spcBef>
+              <a:buClr>
+                <a:schemeClr val="accent5"/>
+              </a:buClr>
+              <a:buFontTx/>
+              <a:buChar char="•"/>
+              <a:defRPr kumimoji="0" sz="1800" kern="1200">
+                <a:solidFill>
+                  <a:schemeClr val="tx1"/>
+                </a:solidFill>
+                <a:latin typeface="+mn-lt"/>
+                <a:ea typeface="+mn-ea"/>
+                <a:cs typeface="+mn-cs"/>
+              </a:defRPr>
+            </a:lvl5pPr>
+            <a:lvl6pPr marL="1645920" indent="-182880" algn="l" rtl="0" eaLnBrk="1" latinLnBrk="0" hangingPunct="1">
+              <a:spcBef>
+                <a:spcPct val="20000"/>
+              </a:spcBef>
+              <a:buClr>
+                <a:schemeClr val="accent6"/>
+              </a:buClr>
+              <a:buSzPct val="80000"/>
+              <a:buFont typeface="Wingdings 2"/>
+              <a:buChar char=""/>
+              <a:defRPr kumimoji="0" sz="1800" kern="1200">
+                <a:solidFill>
+                  <a:schemeClr val="tx1"/>
+                </a:solidFill>
+                <a:latin typeface="+mn-lt"/>
+                <a:ea typeface="+mn-ea"/>
+                <a:cs typeface="+mn-cs"/>
+              </a:defRPr>
+            </a:lvl6pPr>
+            <a:lvl7pPr marL="1920240" indent="-182880" algn="l" rtl="0" eaLnBrk="1" latinLnBrk="0" hangingPunct="1">
+              <a:spcBef>
+                <a:spcPct val="20000"/>
+              </a:spcBef>
+              <a:buClr>
+                <a:schemeClr val="accent1">
+                  <a:shade val="75000"/>
+                </a:schemeClr>
+              </a:buClr>
+              <a:buSzPct val="90000"/>
+              <a:buChar char="•"/>
+              <a:defRPr kumimoji="0" sz="1600" kern="1200" baseline="0">
+                <a:solidFill>
+                  <a:schemeClr val="tx1"/>
+                </a:solidFill>
+                <a:latin typeface="+mn-lt"/>
+                <a:ea typeface="+mn-ea"/>
+                <a:cs typeface="+mn-cs"/>
+              </a:defRPr>
+            </a:lvl7pPr>
+            <a:lvl8pPr marL="2103120" indent="-182880" algn="l" rtl="0" eaLnBrk="1" latinLnBrk="0" hangingPunct="1">
+              <a:spcBef>
+                <a:spcPct val="20000"/>
+              </a:spcBef>
+              <a:buClr>
+                <a:schemeClr val="accent4">
+                  <a:shade val="75000"/>
+                </a:schemeClr>
+              </a:buClr>
+              <a:buChar char="•"/>
+              <a:defRPr kumimoji="0" sz="1600" kern="1200">
+                <a:solidFill>
+                  <a:schemeClr val="tx1"/>
+                </a:solidFill>
+                <a:latin typeface="+mn-lt"/>
+                <a:ea typeface="+mn-ea"/>
+                <a:cs typeface="+mn-cs"/>
+              </a:defRPr>
+            </a:lvl8pPr>
+            <a:lvl9pPr marL="2377440" indent="-182880" algn="l" rtl="0" eaLnBrk="1" latinLnBrk="0" hangingPunct="1">
+              <a:spcBef>
+                <a:spcPct val="20000"/>
+              </a:spcBef>
+              <a:buClr>
+                <a:schemeClr val="accent2">
+                  <a:shade val="75000"/>
+                </a:schemeClr>
+              </a:buClr>
+              <a:buSzPct val="90000"/>
+              <a:buChar char="•"/>
+              <a:defRPr kumimoji="0" sz="1400" kern="1200" cap="all" baseline="0">
+                <a:solidFill>
+                  <a:schemeClr val="tx1"/>
+                </a:solidFill>
+                <a:latin typeface="+mn-lt"/>
+                <a:ea typeface="+mn-ea"/>
+                <a:cs typeface="+mn-cs"/>
+              </a:defRPr>
+            </a:lvl9pPr>
+          </a:lstStyle>
+          <a:p>
+            <a:endParaRPr lang="en-US" sz="1800" smtClean="0"/>
+          </a:p>
+          <a:p>
+            <a:endParaRPr lang="en-US" sz="1800" dirty="0" smtClean="0"/>
+          </a:p>
+        </p:txBody>
+      </p:sp>
+    </p:spTree>
+    <p:extLst>
+      <p:ext uri="{BB962C8B-B14F-4D97-AF65-F5344CB8AC3E}">
+        <p14:creationId xmlns:p14="http://schemas.microsoft.com/office/powerpoint/2010/main" val="351063154"/>
       </p:ext>
     </p:extLst>
   </p:cSld>
@@ -8837,7 +10352,7 @@
           <a:p>
             <a:r>
               <a:rPr lang="en-US" dirty="0" smtClean="0"/>
-              <a:t>Project Background</a:t>
+              <a:t>Project Outline</a:t>
             </a:r>
             <a:endParaRPr lang="en-US" dirty="0"/>
           </a:p>
@@ -8856,54 +10371,94 @@
         <p:spPr/>
         <p:txBody>
           <a:bodyPr>
-            <a:normAutofit/>
+            <a:normAutofit fontScale="85000" lnSpcReduction="20000"/>
           </a:bodyPr>
           <a:lstStyle/>
           <a:p>
             <a:r>
               <a:rPr lang="en-US" sz="3000" dirty="0" smtClean="0"/>
-              <a:t>In Hockey, there has been a renaissance of “advanced” statistics.</a:t>
+              <a:t>Background</a:t>
             </a:r>
           </a:p>
           <a:p>
             <a:pPr lvl="1"/>
             <a:r>
               <a:rPr lang="en-US" sz="2500" dirty="0" smtClean="0"/>
-              <a:t>Fans, the league itself and teams have made their work publically available.</a:t>
+              <a:t>The problem</a:t>
             </a:r>
           </a:p>
           <a:p>
             <a:pPr lvl="1"/>
             <a:r>
               <a:rPr lang="en-US" sz="2500" dirty="0" smtClean="0"/>
-              <a:t>The average person now has access to a variety of metrics and many opportunities to test his/her own hypothesis.</a:t>
+              <a:t>Datasets</a:t>
             </a:r>
           </a:p>
           <a:p>
             <a:r>
               <a:rPr lang="en-US" sz="3000" dirty="0" smtClean="0"/>
-              <a:t>The NHL Playoffs Start on </a:t>
-            </a:r>
-            <a:r>
-              <a:rPr lang="en-US" sz="3000" smtClean="0"/>
-              <a:t>April 12</a:t>
-            </a:r>
-            <a:r>
-              <a:rPr lang="en-US" sz="3000" baseline="30000" smtClean="0"/>
-              <a:t>th</a:t>
-            </a:r>
-            <a:endParaRPr lang="en-US" sz="3000" dirty="0"/>
+              <a:t>Exploratory Data Analysis</a:t>
+            </a:r>
           </a:p>
           <a:p>
             <a:pPr lvl="1"/>
             <a:r>
               <a:rPr lang="en-US" sz="2500" dirty="0" smtClean="0"/>
-              <a:t>There is an excellent opportunity to train a model using historical data and then test it on 2015-2016 season</a:t>
+              <a:t>Features</a:t>
             </a:r>
           </a:p>
           <a:p>
             <a:pPr lvl="1"/>
+            <a:r>
+              <a:rPr lang="en-US" sz="2500" dirty="0" err="1" smtClean="0"/>
+              <a:t>Collinearity</a:t>
+            </a:r>
             <a:endParaRPr lang="en-US" sz="2500" dirty="0" smtClean="0"/>
+          </a:p>
+          <a:p>
+            <a:r>
+              <a:rPr lang="en-US" sz="3000" dirty="0" smtClean="0"/>
+              <a:t>Models</a:t>
+            </a:r>
+          </a:p>
+          <a:p>
+            <a:pPr lvl="1"/>
+            <a:r>
+              <a:rPr lang="en-US" sz="2500" dirty="0" err="1" smtClean="0"/>
+              <a:t>Logit</a:t>
+            </a:r>
+            <a:endParaRPr lang="en-US" sz="2500" dirty="0" smtClean="0"/>
+          </a:p>
+          <a:p>
+            <a:pPr lvl="1"/>
+            <a:r>
+              <a:rPr lang="en-US" sz="2500" dirty="0" smtClean="0"/>
+              <a:t>Decision Tree</a:t>
+            </a:r>
+          </a:p>
+          <a:p>
+            <a:r>
+              <a:rPr lang="en-US" sz="3000" dirty="0" smtClean="0"/>
+              <a:t>Predicting 2016</a:t>
+            </a:r>
+          </a:p>
+          <a:p>
+            <a:r>
+              <a:rPr lang="en-US" sz="3000" dirty="0" smtClean="0"/>
+              <a:t>Next Steps</a:t>
+            </a:r>
+          </a:p>
+          <a:p>
+            <a:r>
+              <a:rPr lang="en-US" sz="3000" dirty="0" smtClean="0"/>
+              <a:t>Appendix</a:t>
+            </a:r>
+          </a:p>
+          <a:p>
+            <a:pPr marL="0" indent="0">
+              <a:buNone/>
+            </a:pPr>
+            <a:endParaRPr lang="en-US" sz="3000" dirty="0" smtClean="0"/>
           </a:p>
           <a:p>
             <a:pPr lvl="1"/>
@@ -8914,7 +10469,7 @@
     </p:spTree>
     <p:extLst>
       <p:ext uri="{BB962C8B-B14F-4D97-AF65-F5344CB8AC3E}">
-        <p14:creationId xmlns:p14="http://schemas.microsoft.com/office/powerpoint/2010/main" val="1511939186"/>
+        <p14:creationId xmlns:p14="http://schemas.microsoft.com/office/powerpoint/2010/main" val="3009859032"/>
       </p:ext>
     </p:extLst>
   </p:cSld>
@@ -8958,7 +10513,7 @@
           <a:p>
             <a:r>
               <a:rPr lang="en-US" dirty="0" smtClean="0"/>
-              <a:t>Problem Summary</a:t>
+              <a:t>Project Background</a:t>
             </a:r>
             <a:endParaRPr lang="en-US" dirty="0"/>
           </a:p>
@@ -8974,87 +10529,68 @@
             <p:ph sz="quarter" idx="1"/>
           </p:nvPr>
         </p:nvSpPr>
-        <p:spPr>
-          <a:xfrm>
-            <a:off x="301752" y="1527048"/>
-            <a:ext cx="7366753" cy="4572000"/>
-          </a:xfrm>
-        </p:spPr>
-        <p:txBody>
-          <a:bodyPr rIns="457200"/>
-          <a:lstStyle/>
-          <a:p>
-            <a:pPr marL="0" indent="0">
-              <a:buNone/>
-            </a:pPr>
-            <a:r>
-              <a:rPr lang="en-US" dirty="0" smtClean="0"/>
-              <a:t>Problem Statement:</a:t>
-            </a:r>
-          </a:p>
-          <a:p>
-            <a:pPr marL="911225" indent="0" algn="just">
-              <a:buNone/>
-            </a:pPr>
-            <a:r>
-              <a:rPr lang="en-US" sz="2000" dirty="0" smtClean="0"/>
-              <a:t>Using data provided from the NHL, what statistics are most useful for predicting a playoff appearance for a team given their season’s performance.</a:t>
-            </a:r>
-          </a:p>
-          <a:p>
-            <a:pPr marL="911225" indent="0" algn="just">
-              <a:buNone/>
-            </a:pPr>
-            <a:endParaRPr lang="en-US" sz="2000" dirty="0"/>
-          </a:p>
-          <a:p>
-            <a:pPr marL="0" indent="0">
-              <a:buNone/>
-            </a:pPr>
-            <a:r>
-              <a:rPr lang="en-US" dirty="0" smtClean="0"/>
-              <a:t>Hypothesis</a:t>
-            </a:r>
-            <a:r>
-              <a:rPr lang="en-US" sz="2000" dirty="0" smtClean="0"/>
-              <a:t>:</a:t>
-            </a:r>
-            <a:endParaRPr lang="en-US" sz="2000" dirty="0"/>
-          </a:p>
-          <a:p>
-            <a:pPr marL="911225" indent="0" algn="just">
-              <a:buNone/>
-            </a:pPr>
-            <a:r>
-              <a:rPr lang="en-US" sz="2000" dirty="0" smtClean="0"/>
-              <a:t>“Possession” based statistics are going to be better predictors than traditional statistics like “score differential” or “penalty minutes.”</a:t>
-            </a:r>
-            <a:endParaRPr lang="en-US" sz="2000" dirty="0"/>
-          </a:p>
-          <a:p>
-            <a:pPr marL="0" indent="0" algn="just" defTabSz="520700">
-              <a:buNone/>
-            </a:pPr>
-            <a:endParaRPr lang="en-US" sz="2000" dirty="0" smtClean="0"/>
-          </a:p>
-          <a:p>
-            <a:pPr marL="911225" indent="0" algn="just">
-              <a:buNone/>
-            </a:pPr>
-            <a:endParaRPr lang="en-US" sz="2000" dirty="0"/>
-          </a:p>
-          <a:p>
-            <a:pPr marL="0" indent="0" algn="just">
-              <a:buNone/>
-            </a:pPr>
-            <a:endParaRPr lang="en-US" sz="2000" dirty="0" smtClean="0"/>
+        <p:spPr/>
+        <p:txBody>
+          <a:bodyPr>
+            <a:normAutofit/>
+          </a:bodyPr>
+          <a:lstStyle/>
+          <a:p>
+            <a:r>
+              <a:rPr lang="en-US" sz="3000" dirty="0" smtClean="0"/>
+              <a:t>In Hockey, there has been a renaissance of “advanced” statistics.</a:t>
+            </a:r>
+          </a:p>
+          <a:p>
+            <a:pPr lvl="1"/>
+            <a:r>
+              <a:rPr lang="en-US" sz="2500" dirty="0" smtClean="0"/>
+              <a:t>Fans, the league itself and teams have made their work publically available.</a:t>
+            </a:r>
+          </a:p>
+          <a:p>
+            <a:pPr lvl="1"/>
+            <a:r>
+              <a:rPr lang="en-US" sz="2500" dirty="0" smtClean="0"/>
+              <a:t>The average person now has access to a variety of metrics and many opportunities to test his/her own hypothesis.</a:t>
+            </a:r>
+          </a:p>
+          <a:p>
+            <a:r>
+              <a:rPr lang="en-US" sz="3000" dirty="0" smtClean="0"/>
+              <a:t>The NHL Playoffs Start on </a:t>
+            </a:r>
+            <a:r>
+              <a:rPr lang="en-US" sz="3000" smtClean="0"/>
+              <a:t>April 12</a:t>
+            </a:r>
+            <a:r>
+              <a:rPr lang="en-US" sz="3000" baseline="30000" smtClean="0"/>
+              <a:t>th</a:t>
+            </a:r>
+            <a:endParaRPr lang="en-US" sz="3000" dirty="0"/>
+          </a:p>
+          <a:p>
+            <a:pPr lvl="1"/>
+            <a:r>
+              <a:rPr lang="en-US" sz="2500" dirty="0" smtClean="0"/>
+              <a:t>There is an excellent opportunity to train a model using historical data and then test it on 2015-2016 season</a:t>
+            </a:r>
+          </a:p>
+          <a:p>
+            <a:pPr lvl="1"/>
+            <a:endParaRPr lang="en-US" sz="2500" dirty="0" smtClean="0"/>
+          </a:p>
+          <a:p>
+            <a:pPr lvl="1"/>
+            <a:endParaRPr lang="en-US" sz="2500" dirty="0"/>
           </a:p>
         </p:txBody>
       </p:sp>
     </p:spTree>
     <p:extLst>
       <p:ext uri="{BB962C8B-B14F-4D97-AF65-F5344CB8AC3E}">
-        <p14:creationId xmlns:p14="http://schemas.microsoft.com/office/powerpoint/2010/main" val="2488554898"/>
+        <p14:creationId xmlns:p14="http://schemas.microsoft.com/office/powerpoint/2010/main" val="1511939186"/>
       </p:ext>
     </p:extLst>
   </p:cSld>
@@ -9098,7 +10634,7 @@
           <a:p>
             <a:r>
               <a:rPr lang="en-US" dirty="0" smtClean="0"/>
-              <a:t>The Datasets</a:t>
+              <a:t>Problem Summary</a:t>
             </a:r>
             <a:endParaRPr lang="en-US" dirty="0"/>
           </a:p>
@@ -9117,146 +10653,84 @@
         <p:spPr>
           <a:xfrm>
             <a:off x="301752" y="1527048"/>
-            <a:ext cx="5673495" cy="4572000"/>
+            <a:ext cx="7366753" cy="4572000"/>
           </a:xfrm>
         </p:spPr>
         <p:txBody>
           <a:bodyPr rIns="457200"/>
           <a:lstStyle/>
           <a:p>
+            <a:pPr marL="0" indent="0">
+              <a:buNone/>
+            </a:pPr>
             <a:r>
               <a:rPr lang="en-US" dirty="0" smtClean="0"/>
-              <a:t>The massive amount of available data is the biggest hurdle to success</a:t>
-            </a:r>
-          </a:p>
-          <a:p>
-            <a:pPr lvl="1"/>
-            <a:r>
-              <a:rPr lang="en-US" sz="1800" dirty="0" smtClean="0"/>
-              <a:t>Data is available from:</a:t>
-            </a:r>
-            <a:endParaRPr lang="en-US" sz="1300" dirty="0"/>
-          </a:p>
-          <a:p>
-            <a:pPr lvl="2"/>
-            <a:r>
-              <a:rPr lang="en-US" sz="1600" dirty="0" err="1" smtClean="0"/>
-              <a:t>NHL.com</a:t>
-            </a:r>
-            <a:endParaRPr lang="en-US" sz="1600" dirty="0" smtClean="0"/>
-          </a:p>
-          <a:p>
-            <a:pPr lvl="2"/>
-            <a:r>
-              <a:rPr lang="en-US" sz="1600" dirty="0" smtClean="0"/>
-              <a:t>Hockey-</a:t>
-            </a:r>
-            <a:r>
-              <a:rPr lang="en-US" sz="1600" dirty="0" err="1" smtClean="0"/>
-              <a:t>Reference.com</a:t>
-            </a:r>
-            <a:endParaRPr lang="en-US" sz="1600" dirty="0" smtClean="0"/>
-          </a:p>
-          <a:p>
-            <a:pPr lvl="2"/>
-            <a:r>
-              <a:rPr lang="en-US" sz="1600" dirty="0" smtClean="0"/>
-              <a:t>War On Ice</a:t>
-            </a:r>
-          </a:p>
-          <a:p>
-            <a:pPr lvl="2"/>
-            <a:r>
-              <a:rPr lang="en-US" sz="1600" dirty="0" smtClean="0"/>
-              <a:t>Hockey Analytics</a:t>
-            </a:r>
-          </a:p>
-          <a:p>
-            <a:pPr lvl="2"/>
-            <a:r>
-              <a:rPr lang="en-US" sz="1600" dirty="0" smtClean="0"/>
-              <a:t>Hockey </a:t>
-            </a:r>
-            <a:r>
-              <a:rPr lang="en-US" sz="1600" dirty="0" err="1" smtClean="0"/>
-              <a:t>Viz</a:t>
-            </a:r>
-            <a:endParaRPr lang="en-US" sz="1600" dirty="0" smtClean="0"/>
-          </a:p>
-          <a:p>
-            <a:pPr lvl="2"/>
-            <a:r>
-              <a:rPr lang="en-US" sz="1600" dirty="0" smtClean="0"/>
-              <a:t>Over 10 other websites and data sources</a:t>
-            </a:r>
-          </a:p>
-          <a:p>
-            <a:r>
-              <a:rPr lang="en-US" sz="2300" dirty="0" smtClean="0"/>
-              <a:t>After hours of looking at tables, I decided to use the “Advanced Stats” set form Hockey Reference</a:t>
-            </a:r>
-          </a:p>
-        </p:txBody>
-      </p:sp>
-      <p:pic>
-        <p:nvPicPr>
-          <p:cNvPr id="4" name="Picture 3"/>
-          <p:cNvPicPr>
-            <a:picLocks noChangeAspect="1"/>
-          </p:cNvPicPr>
-          <p:nvPr/>
-        </p:nvPicPr>
-        <p:blipFill>
-          <a:blip r:embed="rId2"/>
-          <a:stretch>
-            <a:fillRect/>
-          </a:stretch>
-        </p:blipFill>
-        <p:spPr>
-          <a:xfrm>
-            <a:off x="5350332" y="1986174"/>
-            <a:ext cx="3485820" cy="4357074"/>
-          </a:xfrm>
-          <a:prstGeom prst="rect">
-            <a:avLst/>
-          </a:prstGeom>
-        </p:spPr>
-      </p:pic>
-      <p:sp>
-        <p:nvSpPr>
-          <p:cNvPr id="5" name="TextBox 4"/>
-          <p:cNvSpPr txBox="1"/>
-          <p:nvPr/>
-        </p:nvSpPr>
-        <p:spPr>
-          <a:xfrm>
-            <a:off x="4801494" y="1527048"/>
-            <a:ext cx="4342506" cy="369332"/>
-          </a:xfrm>
-          <a:prstGeom prst="rect">
-            <a:avLst/>
-          </a:prstGeom>
-          <a:noFill/>
-        </p:spPr>
-        <p:txBody>
-          <a:bodyPr wrap="square" rtlCol="0">
-            <a:spAutoFit/>
-          </a:bodyPr>
-          <a:lstStyle/>
-          <a:p>
-            <a:pPr algn="ctr"/>
-            <a:r>
-              <a:rPr lang="en-US" b="1" u="sng" dirty="0" smtClean="0"/>
-              <a:t>1 of 3 bookmark folders for data</a:t>
-            </a:r>
-            <a:endParaRPr lang="en-US" b="1" u="sng" dirty="0"/>
+              <a:t>Problem Statement:</a:t>
+            </a:r>
+          </a:p>
+          <a:p>
+            <a:pPr marL="911225" indent="0" algn="just">
+              <a:buNone/>
+            </a:pPr>
+            <a:r>
+              <a:rPr lang="en-US" sz="2000" dirty="0" smtClean="0"/>
+              <a:t>Using data provided from the NHL, what statistics are most useful for predicting a playoff appearance for a team given their season’s performance.</a:t>
+            </a:r>
+          </a:p>
+          <a:p>
+            <a:pPr marL="911225" indent="0" algn="just">
+              <a:buNone/>
+            </a:pPr>
+            <a:endParaRPr lang="en-US" sz="2000" dirty="0"/>
+          </a:p>
+          <a:p>
+            <a:pPr marL="0" indent="0">
+              <a:buNone/>
+            </a:pPr>
+            <a:r>
+              <a:rPr lang="en-US" dirty="0" smtClean="0"/>
+              <a:t>Hypothesis</a:t>
+            </a:r>
+            <a:r>
+              <a:rPr lang="en-US" sz="2000" dirty="0" smtClean="0"/>
+              <a:t>:</a:t>
+            </a:r>
+            <a:endParaRPr lang="en-US" sz="2000" dirty="0"/>
+          </a:p>
+          <a:p>
+            <a:pPr marL="911225" indent="0" algn="just">
+              <a:buNone/>
+            </a:pPr>
+            <a:r>
+              <a:rPr lang="en-US" sz="2000" dirty="0" smtClean="0"/>
+              <a:t>“Possession” based statistics are going to be better predictors than traditional statistics like “score differential” or “penalty minutes.”</a:t>
+            </a:r>
+            <a:endParaRPr lang="en-US" sz="2000" dirty="0"/>
+          </a:p>
+          <a:p>
+            <a:pPr marL="0" indent="0" algn="just" defTabSz="520700">
+              <a:buNone/>
+            </a:pPr>
+            <a:endParaRPr lang="en-US" sz="2000" dirty="0" smtClean="0"/>
+          </a:p>
+          <a:p>
+            <a:pPr marL="911225" indent="0" algn="just">
+              <a:buNone/>
+            </a:pPr>
+            <a:endParaRPr lang="en-US" sz="2000" dirty="0"/>
+          </a:p>
+          <a:p>
+            <a:pPr marL="0" indent="0" algn="just">
+              <a:buNone/>
+            </a:pPr>
+            <a:endParaRPr lang="en-US" sz="2000" dirty="0" smtClean="0"/>
           </a:p>
         </p:txBody>
       </p:sp>
     </p:spTree>
     <p:extLst>
       <p:ext uri="{BB962C8B-B14F-4D97-AF65-F5344CB8AC3E}">
-        <p14:creationId xmlns:p14="http://schemas.microsoft.com/office/powerpoint/2010/main" val="2007500246"/>
+        <p14:creationId xmlns:p14="http://schemas.microsoft.com/office/powerpoint/2010/main" val="2488554898"/>
       </p:ext>
     </p:extLst>
   </p:cSld>
@@ -9300,7 +10774,7 @@
           <a:p>
             <a:r>
               <a:rPr lang="en-US" dirty="0" smtClean="0"/>
-              <a:t>A Roadmap To Predictions</a:t>
+              <a:t>The Datasets</a:t>
             </a:r>
             <a:endParaRPr lang="en-US" dirty="0"/>
           </a:p>
@@ -9319,88 +10793,146 @@
         <p:spPr>
           <a:xfrm>
             <a:off x="301752" y="1527048"/>
-            <a:ext cx="8534400" cy="4572000"/>
-          </a:xfrm>
-        </p:spPr>
-        <p:txBody>
-          <a:bodyPr rIns="457200">
-            <a:normAutofit/>
+            <a:ext cx="5673495" cy="4572000"/>
+          </a:xfrm>
+        </p:spPr>
+        <p:txBody>
+          <a:bodyPr rIns="457200"/>
+          <a:lstStyle/>
+          <a:p>
+            <a:r>
+              <a:rPr lang="en-US" dirty="0" smtClean="0"/>
+              <a:t>The massive amount of available data is the biggest hurdle to success</a:t>
+            </a:r>
+          </a:p>
+          <a:p>
+            <a:pPr lvl="1"/>
+            <a:r>
+              <a:rPr lang="en-US" sz="1800" dirty="0" smtClean="0"/>
+              <a:t>Data is available from:</a:t>
+            </a:r>
+            <a:endParaRPr lang="en-US" sz="1300" dirty="0"/>
+          </a:p>
+          <a:p>
+            <a:pPr lvl="2"/>
+            <a:r>
+              <a:rPr lang="en-US" sz="1600" dirty="0" err="1" smtClean="0"/>
+              <a:t>NHL.com</a:t>
+            </a:r>
+            <a:endParaRPr lang="en-US" sz="1600" dirty="0" smtClean="0"/>
+          </a:p>
+          <a:p>
+            <a:pPr lvl="2"/>
+            <a:r>
+              <a:rPr lang="en-US" sz="1600" dirty="0" smtClean="0"/>
+              <a:t>Hockey-</a:t>
+            </a:r>
+            <a:r>
+              <a:rPr lang="en-US" sz="1600" dirty="0" err="1" smtClean="0"/>
+              <a:t>Reference.com</a:t>
+            </a:r>
+            <a:endParaRPr lang="en-US" sz="1600" dirty="0" smtClean="0"/>
+          </a:p>
+          <a:p>
+            <a:pPr lvl="2"/>
+            <a:r>
+              <a:rPr lang="en-US" sz="1600" dirty="0" smtClean="0"/>
+              <a:t>War On Ice</a:t>
+            </a:r>
+          </a:p>
+          <a:p>
+            <a:pPr lvl="2"/>
+            <a:r>
+              <a:rPr lang="en-US" sz="1600" dirty="0" smtClean="0"/>
+              <a:t>Hockey Analytics</a:t>
+            </a:r>
+          </a:p>
+          <a:p>
+            <a:pPr lvl="2"/>
+            <a:r>
+              <a:rPr lang="en-US" sz="1600" dirty="0" smtClean="0"/>
+              <a:t>Hockey </a:t>
+            </a:r>
+            <a:r>
+              <a:rPr lang="en-US" sz="1600" dirty="0" err="1" smtClean="0"/>
+              <a:t>Viz</a:t>
+            </a:r>
+            <a:endParaRPr lang="en-US" sz="1600" dirty="0" smtClean="0"/>
+          </a:p>
+          <a:p>
+            <a:pPr lvl="2"/>
+            <a:r>
+              <a:rPr lang="en-US" sz="1600" dirty="0" smtClean="0"/>
+              <a:t>Over 10 other websites and data sources</a:t>
+            </a:r>
+          </a:p>
+          <a:p>
+            <a:r>
+              <a:rPr lang="en-US" sz="2300" dirty="0" smtClean="0"/>
+              <a:t>After hours of looking at tables, I decided to use the “Advanced Stats” set form Hockey Reference</a:t>
+            </a:r>
+          </a:p>
+        </p:txBody>
+      </p:sp>
+      <p:pic>
+        <p:nvPicPr>
+          <p:cNvPr id="4" name="Picture 3"/>
+          <p:cNvPicPr>
+            <a:picLocks noChangeAspect="1"/>
+          </p:cNvPicPr>
+          <p:nvPr/>
+        </p:nvPicPr>
+        <p:blipFill>
+          <a:blip r:embed="rId2"/>
+          <a:stretch>
+            <a:fillRect/>
+          </a:stretch>
+        </p:blipFill>
+        <p:spPr>
+          <a:xfrm>
+            <a:off x="5350332" y="1986174"/>
+            <a:ext cx="3485820" cy="4357074"/>
+          </a:xfrm>
+          <a:prstGeom prst="rect">
+            <a:avLst/>
+          </a:prstGeom>
+        </p:spPr>
+      </p:pic>
+      <p:sp>
+        <p:nvSpPr>
+          <p:cNvPr id="5" name="TextBox 4"/>
+          <p:cNvSpPr txBox="1"/>
+          <p:nvPr/>
+        </p:nvSpPr>
+        <p:spPr>
+          <a:xfrm>
+            <a:off x="4801494" y="1527048"/>
+            <a:ext cx="4342506" cy="369332"/>
+          </a:xfrm>
+          <a:prstGeom prst="rect">
+            <a:avLst/>
+          </a:prstGeom>
+          <a:noFill/>
+        </p:spPr>
+        <p:txBody>
+          <a:bodyPr wrap="square" rtlCol="0">
+            <a:spAutoFit/>
           </a:bodyPr>
           <a:lstStyle/>
           <a:p>
-            <a:r>
-              <a:rPr lang="en-US" sz="2400" dirty="0" smtClean="0"/>
-              <a:t>Data is not easily aligned from one set to another</a:t>
-            </a:r>
-          </a:p>
-          <a:p>
-            <a:pPr lvl="1"/>
-            <a:r>
-              <a:rPr lang="en-US" sz="2000" dirty="0" smtClean="0"/>
-              <a:t>It was necessary to identify a schema and stick with it</a:t>
-            </a:r>
-          </a:p>
-          <a:p>
-            <a:pPr lvl="1"/>
-            <a:r>
-              <a:rPr lang="en-US" sz="2000" dirty="0" smtClean="0"/>
-              <a:t>The time cost of preprocessing data to ensure consistency is high</a:t>
-            </a:r>
-          </a:p>
-          <a:p>
-            <a:r>
-              <a:rPr lang="en-US" sz="2400" dirty="0" smtClean="0"/>
-              <a:t>After identifying the dataset, plan modeling methods</a:t>
-            </a:r>
-          </a:p>
-          <a:p>
-            <a:pPr lvl="1"/>
-            <a:r>
-              <a:rPr lang="en-US" sz="2000" dirty="0" smtClean="0"/>
-              <a:t>Binary </a:t>
-            </a:r>
-            <a:r>
-              <a:rPr lang="en-US" sz="2000" dirty="0" err="1" smtClean="0"/>
-              <a:t>Logit</a:t>
-            </a:r>
-            <a:r>
-              <a:rPr lang="en-US" sz="2000" dirty="0" smtClean="0"/>
-              <a:t> Model</a:t>
-            </a:r>
-          </a:p>
-          <a:p>
-            <a:pPr lvl="1"/>
-            <a:r>
-              <a:rPr lang="en-US" sz="2000" dirty="0" smtClean="0"/>
-              <a:t>Decision Tree</a:t>
-            </a:r>
-          </a:p>
-          <a:p>
-            <a:r>
-              <a:rPr lang="en-US" sz="2400" dirty="0" smtClean="0"/>
-              <a:t>Desired Results</a:t>
-            </a:r>
-          </a:p>
-          <a:p>
-            <a:pPr lvl="1"/>
-            <a:r>
-              <a:rPr lang="en-US" sz="1900" dirty="0" smtClean="0"/>
-              <a:t>A clear identifier or classifier for achieving the playoffs</a:t>
-            </a:r>
-          </a:p>
-          <a:p>
-            <a:pPr lvl="1"/>
-            <a:r>
-              <a:rPr lang="en-US" sz="1900" dirty="0" smtClean="0"/>
-              <a:t>Easily replicable models to apply 2015-2016 statistics to</a:t>
-            </a:r>
+            <a:pPr algn="ctr"/>
+            <a:r>
+              <a:rPr lang="en-US" b="1" u="sng" dirty="0" smtClean="0"/>
+              <a:t>1 of 3 bookmark folders for data</a:t>
+            </a:r>
+            <a:endParaRPr lang="en-US" b="1" u="sng" dirty="0"/>
           </a:p>
         </p:txBody>
       </p:sp>
     </p:spTree>
     <p:extLst>
       <p:ext uri="{BB962C8B-B14F-4D97-AF65-F5344CB8AC3E}">
-        <p14:creationId xmlns:p14="http://schemas.microsoft.com/office/powerpoint/2010/main" val="1131957353"/>
+        <p14:creationId xmlns:p14="http://schemas.microsoft.com/office/powerpoint/2010/main" val="2007500246"/>
       </p:ext>
     </p:extLst>
   </p:cSld>
@@ -9444,7 +10976,7 @@
           <a:p>
             <a:r>
               <a:rPr lang="en-US" dirty="0" smtClean="0"/>
-              <a:t>Sample Dataset</a:t>
+              <a:t>A Roadmap To Predictions</a:t>
             </a:r>
             <a:endParaRPr lang="en-US" dirty="0"/>
           </a:p>
@@ -9474,100 +11006,77 @@
           <a:p>
             <a:r>
               <a:rPr lang="en-US" sz="2400" dirty="0" smtClean="0"/>
-              <a:t>Dataset consists of each teams individual season statistics for a single season. </a:t>
-            </a:r>
-          </a:p>
-          <a:p>
-            <a:pPr marL="0" indent="0">
-              <a:buNone/>
-            </a:pPr>
-            <a:r>
-              <a:rPr lang="en-US" sz="2400" dirty="0"/>
-              <a:t> </a:t>
-            </a:r>
-            <a:endParaRPr lang="en-US" sz="2400" dirty="0" smtClean="0"/>
-          </a:p>
-          <a:p>
-            <a:pPr marL="0" indent="0">
-              <a:buNone/>
-            </a:pPr>
-            <a:r>
-              <a:rPr lang="en-US" sz="2400" dirty="0"/>
-              <a:t> </a:t>
-            </a:r>
-            <a:endParaRPr lang="en-US" sz="2400" dirty="0" smtClean="0"/>
-          </a:p>
-          <a:p>
-            <a:pPr marL="0" indent="0">
-              <a:buNone/>
-            </a:pPr>
-            <a:r>
-              <a:rPr lang="en-US" sz="2400" dirty="0"/>
-              <a:t> </a:t>
-            </a:r>
-            <a:endParaRPr lang="en-US" sz="2400" dirty="0" smtClean="0"/>
-          </a:p>
-          <a:p>
-            <a:pPr marL="0" indent="0">
-              <a:buNone/>
-            </a:pPr>
-            <a:r>
-              <a:rPr lang="en-US" sz="2400" dirty="0"/>
-              <a:t> </a:t>
-            </a:r>
-            <a:endParaRPr lang="en-US" sz="2400" dirty="0" smtClean="0"/>
-          </a:p>
-          <a:p>
-            <a:endParaRPr lang="en-US" sz="2400" dirty="0"/>
-          </a:p>
-          <a:p>
-            <a:endParaRPr lang="en-US" sz="2400" dirty="0" smtClean="0"/>
+              <a:t>Data is not easily aligned from one set to another</a:t>
+            </a:r>
+          </a:p>
+          <a:p>
+            <a:pPr lvl="1"/>
+            <a:r>
+              <a:rPr lang="en-US" sz="2000" dirty="0" smtClean="0"/>
+              <a:t>It was necessary to identify a schema and stick with it</a:t>
+            </a:r>
+          </a:p>
+          <a:p>
+            <a:pPr lvl="1"/>
+            <a:r>
+              <a:rPr lang="en-US" sz="2000" dirty="0" smtClean="0"/>
+              <a:t>The time cost of preprocessing data to ensure consistency is high</a:t>
+            </a:r>
           </a:p>
           <a:p>
             <a:r>
               <a:rPr lang="en-US" sz="2400" dirty="0" smtClean="0"/>
-              <a:t>The key is identifying the features that are the best predictors  </a:t>
-            </a:r>
-          </a:p>
-          <a:p>
-            <a:endParaRPr lang="en-US" sz="1900" dirty="0" smtClean="0"/>
-          </a:p>
-        </p:txBody>
-      </p:sp>
-      <p:pic>
-        <p:nvPicPr>
-          <p:cNvPr id="4" name="Picture 3" descr="Screen Shot 2016-03-28 at 9.08.52 PM.png"/>
-          <p:cNvPicPr>
-            <a:picLocks noChangeAspect="1"/>
-          </p:cNvPicPr>
-          <p:nvPr/>
-        </p:nvPicPr>
-        <p:blipFill>
-          <a:blip r:embed="rId2">
-            <a:extLst>
-              <a:ext uri="{28A0092B-C50C-407E-A947-70E740481C1C}">
-                <a14:useLocalDpi xmlns:a14="http://schemas.microsoft.com/office/drawing/2010/main" val="0"/>
-              </a:ext>
-            </a:extLst>
-          </a:blip>
-          <a:stretch>
-            <a:fillRect/>
-          </a:stretch>
-        </p:blipFill>
-        <p:spPr>
-          <a:xfrm>
-            <a:off x="716785" y="2621099"/>
-            <a:ext cx="7336366" cy="2170182"/>
-          </a:xfrm>
-          <a:prstGeom prst="rect">
-            <a:avLst/>
-          </a:prstGeom>
-        </p:spPr>
-      </p:pic>
+              <a:t>After identifying the dataset, plan modeling methods</a:t>
+            </a:r>
+          </a:p>
+          <a:p>
+            <a:pPr lvl="1"/>
+            <a:r>
+              <a:rPr lang="en-US" sz="2000" dirty="0" smtClean="0"/>
+              <a:t>Binary </a:t>
+            </a:r>
+            <a:r>
+              <a:rPr lang="en-US" sz="2000" dirty="0" err="1" smtClean="0"/>
+              <a:t>Logit</a:t>
+            </a:r>
+            <a:r>
+              <a:rPr lang="en-US" sz="2000" dirty="0" smtClean="0"/>
+              <a:t> Model</a:t>
+            </a:r>
+          </a:p>
+          <a:p>
+            <a:pPr lvl="1"/>
+            <a:r>
+              <a:rPr lang="en-US" sz="2000" dirty="0" smtClean="0"/>
+              <a:t>Decision Tree</a:t>
+            </a:r>
+          </a:p>
+          <a:p>
+            <a:r>
+              <a:rPr lang="en-US" sz="2400" dirty="0" smtClean="0"/>
+              <a:t>Desired Results</a:t>
+            </a:r>
+          </a:p>
+          <a:p>
+            <a:pPr lvl="1"/>
+            <a:r>
+              <a:rPr lang="en-US" sz="1900" dirty="0" smtClean="0"/>
+              <a:t>A clear identifier or classifier for achieving the playoffs</a:t>
+            </a:r>
+          </a:p>
+          <a:p>
+            <a:pPr lvl="1"/>
+            <a:r>
+              <a:rPr lang="en-US" sz="1900" dirty="0" smtClean="0"/>
+              <a:t>Easily replicable models to apply 2015-2016 statistics to</a:t>
+            </a:r>
+          </a:p>
+        </p:txBody>
+      </p:sp>
     </p:spTree>
     <p:extLst>
       <p:ext uri="{BB962C8B-B14F-4D97-AF65-F5344CB8AC3E}">
-        <p14:creationId xmlns:p14="http://schemas.microsoft.com/office/powerpoint/2010/main" val="159728267"/>
+        <p14:creationId xmlns:p14="http://schemas.microsoft.com/office/powerpoint/2010/main" val="1131957353"/>
       </p:ext>
     </p:extLst>
   </p:cSld>
@@ -9611,7 +11120,7 @@
           <a:p>
             <a:r>
               <a:rPr lang="en-US" dirty="0" smtClean="0"/>
-              <a:t>Exploratory Data Analysis</a:t>
+              <a:t>Sample Dataset</a:t>
             </a:r>
             <a:endParaRPr lang="en-US" dirty="0"/>
           </a:p>
@@ -9629,8 +11138,8 @@
         </p:nvSpPr>
         <p:spPr>
           <a:xfrm>
-            <a:off x="513410" y="1791030"/>
-            <a:ext cx="5201336" cy="4572000"/>
+            <a:off x="301752" y="1527048"/>
+            <a:ext cx="8534400" cy="4572000"/>
           </a:xfrm>
         </p:spPr>
         <p:txBody>
@@ -9640,281 +11149,101 @@
           <a:lstStyle/>
           <a:p>
             <a:r>
-              <a:rPr lang="en-US" sz="1800" dirty="0" smtClean="0"/>
-              <a:t>After looking through the datasets it was easy to see that certain statistics had high levels of </a:t>
-            </a:r>
-            <a:r>
-              <a:rPr lang="en-US" sz="1800" dirty="0" err="1" smtClean="0"/>
-              <a:t>colinearity</a:t>
-            </a:r>
-            <a:endParaRPr lang="en-US" sz="1800" dirty="0" smtClean="0"/>
-          </a:p>
-          <a:p>
-            <a:endParaRPr lang="en-US" sz="1800" dirty="0" smtClean="0"/>
+              <a:rPr lang="en-US" sz="2400" dirty="0" smtClean="0"/>
+              <a:t>Dataset consists of each teams individual season statistics for a single season. </a:t>
+            </a:r>
+          </a:p>
+          <a:p>
+            <a:pPr marL="0" indent="0">
+              <a:buNone/>
+            </a:pPr>
+            <a:r>
+              <a:rPr lang="en-US" sz="2400" dirty="0"/>
+              <a:t> </a:t>
+            </a:r>
+            <a:endParaRPr lang="en-US" sz="2400" dirty="0" smtClean="0"/>
+          </a:p>
+          <a:p>
+            <a:pPr marL="0" indent="0">
+              <a:buNone/>
+            </a:pPr>
+            <a:r>
+              <a:rPr lang="en-US" sz="2400" dirty="0"/>
+              <a:t> </a:t>
+            </a:r>
+            <a:endParaRPr lang="en-US" sz="2400" dirty="0" smtClean="0"/>
+          </a:p>
+          <a:p>
+            <a:pPr marL="0" indent="0">
+              <a:buNone/>
+            </a:pPr>
+            <a:r>
+              <a:rPr lang="en-US" sz="2400" dirty="0"/>
+              <a:t> </a:t>
+            </a:r>
+            <a:endParaRPr lang="en-US" sz="2400" dirty="0" smtClean="0"/>
+          </a:p>
+          <a:p>
+            <a:pPr marL="0" indent="0">
+              <a:buNone/>
+            </a:pPr>
+            <a:r>
+              <a:rPr lang="en-US" sz="2400" dirty="0"/>
+              <a:t> </a:t>
+            </a:r>
+            <a:endParaRPr lang="en-US" sz="2400" dirty="0" smtClean="0"/>
+          </a:p>
+          <a:p>
+            <a:endParaRPr lang="en-US" sz="2400" dirty="0"/>
+          </a:p>
+          <a:p>
+            <a:endParaRPr lang="en-US" sz="2400" dirty="0" smtClean="0"/>
+          </a:p>
+          <a:p>
+            <a:r>
+              <a:rPr lang="en-US" sz="2400" dirty="0" smtClean="0"/>
+              <a:t>The key is identifying the features that are the best predictors  </a:t>
+            </a:r>
+          </a:p>
+          <a:p>
+            <a:endParaRPr lang="en-US" sz="1900" dirty="0" smtClean="0"/>
           </a:p>
         </p:txBody>
       </p:sp>
       <p:pic>
         <p:nvPicPr>
-          <p:cNvPr id="5" name="Picture 4"/>
+          <p:cNvPr id="4" name="Picture 3" descr="Screen Shot 2016-03-28 at 9.08.52 PM.png"/>
           <p:cNvPicPr>
             <a:picLocks noChangeAspect="1"/>
           </p:cNvPicPr>
           <p:nvPr/>
         </p:nvPicPr>
         <p:blipFill>
-          <a:blip r:embed="rId2"/>
+          <a:blip r:embed="rId2">
+            <a:extLst>
+              <a:ext uri="{28A0092B-C50C-407E-A947-70E740481C1C}">
+                <a14:useLocalDpi xmlns:a14="http://schemas.microsoft.com/office/drawing/2010/main" val="0"/>
+              </a:ext>
+            </a:extLst>
+          </a:blip>
           <a:stretch>
             <a:fillRect/>
           </a:stretch>
         </p:blipFill>
         <p:spPr>
           <a:xfrm>
-            <a:off x="5397675" y="1527048"/>
-            <a:ext cx="3438477" cy="2549982"/>
+            <a:off x="716785" y="2621099"/>
+            <a:ext cx="7336366" cy="2170182"/>
           </a:xfrm>
           <a:prstGeom prst="rect">
             <a:avLst/>
           </a:prstGeom>
         </p:spPr>
       </p:pic>
-      <p:pic>
-        <p:nvPicPr>
-          <p:cNvPr id="6" name="Picture 5"/>
-          <p:cNvPicPr>
-            <a:picLocks noChangeAspect="1"/>
-          </p:cNvPicPr>
-          <p:nvPr/>
-        </p:nvPicPr>
-        <p:blipFill>
-          <a:blip r:embed="rId3"/>
-          <a:stretch>
-            <a:fillRect/>
-          </a:stretch>
-        </p:blipFill>
-        <p:spPr>
-          <a:xfrm>
-            <a:off x="301752" y="3051382"/>
-            <a:ext cx="5104271" cy="3394648"/>
-          </a:xfrm>
-          <a:prstGeom prst="rect">
-            <a:avLst/>
-          </a:prstGeom>
-        </p:spPr>
-      </p:pic>
-      <p:sp>
-        <p:nvSpPr>
-          <p:cNvPr id="7" name="Content Placeholder 2"/>
-          <p:cNvSpPr txBox="1">
-            <a:spLocks/>
-          </p:cNvSpPr>
-          <p:nvPr/>
-        </p:nvSpPr>
-        <p:spPr>
-          <a:xfrm>
-            <a:off x="5535652" y="4160030"/>
-            <a:ext cx="3435360" cy="2203000"/>
-          </a:xfrm>
-          <a:prstGeom prst="rect">
-            <a:avLst/>
-          </a:prstGeom>
-        </p:spPr>
-        <p:txBody>
-          <a:bodyPr vert="horz" rIns="457200">
-            <a:normAutofit/>
-          </a:bodyPr>
-          <a:lstStyle>
-            <a:lvl1pPr marL="274320" indent="-274320" algn="l" rtl="0" eaLnBrk="1" latinLnBrk="0" hangingPunct="1">
-              <a:spcBef>
-                <a:spcPct val="20000"/>
-              </a:spcBef>
-              <a:buClr>
-                <a:schemeClr val="accent1"/>
-              </a:buClr>
-              <a:buSzPct val="85000"/>
-              <a:buFont typeface="Wingdings 2"/>
-              <a:buChar char=""/>
-              <a:defRPr kumimoji="0" sz="2700" kern="1200">
-                <a:solidFill>
-                  <a:schemeClr val="tx1"/>
-                </a:solidFill>
-                <a:latin typeface="+mn-lt"/>
-                <a:ea typeface="+mn-ea"/>
-                <a:cs typeface="+mn-cs"/>
-              </a:defRPr>
-            </a:lvl1pPr>
-            <a:lvl2pPr marL="548640" indent="-274320" algn="l" rtl="0" eaLnBrk="1" latinLnBrk="0" hangingPunct="1">
-              <a:spcBef>
-                <a:spcPct val="20000"/>
-              </a:spcBef>
-              <a:buClr>
-                <a:schemeClr val="accent2"/>
-              </a:buClr>
-              <a:buSzPct val="70000"/>
-              <a:buFont typeface="Wingdings"/>
-              <a:buChar char=""/>
-              <a:defRPr kumimoji="0" sz="2200" kern="1200">
-                <a:solidFill>
-                  <a:schemeClr val="tx2"/>
-                </a:solidFill>
-                <a:latin typeface="+mn-lt"/>
-                <a:ea typeface="+mn-ea"/>
-                <a:cs typeface="+mn-cs"/>
-              </a:defRPr>
-            </a:lvl2pPr>
-            <a:lvl3pPr marL="822960" indent="-228600" algn="l" rtl="0" eaLnBrk="1" latinLnBrk="0" hangingPunct="1">
-              <a:spcBef>
-                <a:spcPct val="20000"/>
-              </a:spcBef>
-              <a:buClr>
-                <a:schemeClr val="accent3"/>
-              </a:buClr>
-              <a:buSzPct val="75000"/>
-              <a:buFont typeface="Wingdings 2"/>
-              <a:buChar char=""/>
-              <a:defRPr kumimoji="0" sz="2000" kern="1200">
-                <a:solidFill>
-                  <a:schemeClr val="tx1"/>
-                </a:solidFill>
-                <a:latin typeface="+mn-lt"/>
-                <a:ea typeface="+mn-ea"/>
-                <a:cs typeface="+mn-cs"/>
-              </a:defRPr>
-            </a:lvl3pPr>
-            <a:lvl4pPr marL="1097280" indent="-228600" algn="l" rtl="0" eaLnBrk="1" latinLnBrk="0" hangingPunct="1">
-              <a:spcBef>
-                <a:spcPct val="20000"/>
-              </a:spcBef>
-              <a:buClr>
-                <a:schemeClr val="accent4"/>
-              </a:buClr>
-              <a:buSzPct val="70000"/>
-              <a:buFont typeface="Wingdings"/>
-              <a:buChar char=""/>
-              <a:defRPr kumimoji="0" sz="2000" kern="1200">
-                <a:solidFill>
-                  <a:schemeClr val="tx2"/>
-                </a:solidFill>
-                <a:latin typeface="+mn-lt"/>
-                <a:ea typeface="+mn-ea"/>
-                <a:cs typeface="+mn-cs"/>
-              </a:defRPr>
-            </a:lvl4pPr>
-            <a:lvl5pPr marL="1371600" indent="-228600" algn="l" rtl="0" eaLnBrk="1" latinLnBrk="0" hangingPunct="1">
-              <a:spcBef>
-                <a:spcPct val="20000"/>
-              </a:spcBef>
-              <a:buClr>
-                <a:schemeClr val="accent5"/>
-              </a:buClr>
-              <a:buFontTx/>
-              <a:buChar char="•"/>
-              <a:defRPr kumimoji="0" sz="1800" kern="1200">
-                <a:solidFill>
-                  <a:schemeClr val="tx1"/>
-                </a:solidFill>
-                <a:latin typeface="+mn-lt"/>
-                <a:ea typeface="+mn-ea"/>
-                <a:cs typeface="+mn-cs"/>
-              </a:defRPr>
-            </a:lvl5pPr>
-            <a:lvl6pPr marL="1645920" indent="-182880" algn="l" rtl="0" eaLnBrk="1" latinLnBrk="0" hangingPunct="1">
-              <a:spcBef>
-                <a:spcPct val="20000"/>
-              </a:spcBef>
-              <a:buClr>
-                <a:schemeClr val="accent6"/>
-              </a:buClr>
-              <a:buSzPct val="80000"/>
-              <a:buFont typeface="Wingdings 2"/>
-              <a:buChar char=""/>
-              <a:defRPr kumimoji="0" sz="1800" kern="1200">
-                <a:solidFill>
-                  <a:schemeClr val="tx1"/>
-                </a:solidFill>
-                <a:latin typeface="+mn-lt"/>
-                <a:ea typeface="+mn-ea"/>
-                <a:cs typeface="+mn-cs"/>
-              </a:defRPr>
-            </a:lvl6pPr>
-            <a:lvl7pPr marL="1920240" indent="-182880" algn="l" rtl="0" eaLnBrk="1" latinLnBrk="0" hangingPunct="1">
-              <a:spcBef>
-                <a:spcPct val="20000"/>
-              </a:spcBef>
-              <a:buClr>
-                <a:schemeClr val="accent1">
-                  <a:shade val="75000"/>
-                </a:schemeClr>
-              </a:buClr>
-              <a:buSzPct val="90000"/>
-              <a:buChar char="•"/>
-              <a:defRPr kumimoji="0" sz="1600" kern="1200" baseline="0">
-                <a:solidFill>
-                  <a:schemeClr val="tx1"/>
-                </a:solidFill>
-                <a:latin typeface="+mn-lt"/>
-                <a:ea typeface="+mn-ea"/>
-                <a:cs typeface="+mn-cs"/>
-              </a:defRPr>
-            </a:lvl7pPr>
-            <a:lvl8pPr marL="2103120" indent="-182880" algn="l" rtl="0" eaLnBrk="1" latinLnBrk="0" hangingPunct="1">
-              <a:spcBef>
-                <a:spcPct val="20000"/>
-              </a:spcBef>
-              <a:buClr>
-                <a:schemeClr val="accent4">
-                  <a:shade val="75000"/>
-                </a:schemeClr>
-              </a:buClr>
-              <a:buChar char="•"/>
-              <a:defRPr kumimoji="0" sz="1600" kern="1200">
-                <a:solidFill>
-                  <a:schemeClr val="tx1"/>
-                </a:solidFill>
-                <a:latin typeface="+mn-lt"/>
-                <a:ea typeface="+mn-ea"/>
-                <a:cs typeface="+mn-cs"/>
-              </a:defRPr>
-            </a:lvl8pPr>
-            <a:lvl9pPr marL="2377440" indent="-182880" algn="l" rtl="0" eaLnBrk="1" latinLnBrk="0" hangingPunct="1">
-              <a:spcBef>
-                <a:spcPct val="20000"/>
-              </a:spcBef>
-              <a:buClr>
-                <a:schemeClr val="accent2">
-                  <a:shade val="75000"/>
-                </a:schemeClr>
-              </a:buClr>
-              <a:buSzPct val="90000"/>
-              <a:buChar char="•"/>
-              <a:defRPr kumimoji="0" sz="1400" kern="1200" cap="all" baseline="0">
-                <a:solidFill>
-                  <a:schemeClr val="tx1"/>
-                </a:solidFill>
-                <a:latin typeface="+mn-lt"/>
-                <a:ea typeface="+mn-ea"/>
-                <a:cs typeface="+mn-cs"/>
-              </a:defRPr>
-            </a:lvl9pPr>
-          </a:lstStyle>
-          <a:p>
-            <a:r>
-              <a:rPr lang="en-US" sz="1800" dirty="0" smtClean="0"/>
-              <a:t>Data also appears to be normally distributed</a:t>
-            </a:r>
-          </a:p>
-          <a:p>
-            <a:r>
-              <a:rPr lang="en-US" sz="1800" dirty="0" smtClean="0"/>
-              <a:t>This will make it easier for modeling as it will mean avoiding a transformation</a:t>
-            </a:r>
-          </a:p>
-        </p:txBody>
-      </p:sp>
     </p:spTree>
     <p:extLst>
       <p:ext uri="{BB962C8B-B14F-4D97-AF65-F5344CB8AC3E}">
-        <p14:creationId xmlns:p14="http://schemas.microsoft.com/office/powerpoint/2010/main" val="1456697042"/>
+        <p14:creationId xmlns:p14="http://schemas.microsoft.com/office/powerpoint/2010/main" val="159728267"/>
       </p:ext>
     </p:extLst>
   </p:cSld>
@@ -9977,7 +11306,7 @@
         <p:spPr>
           <a:xfrm>
             <a:off x="513410" y="1791030"/>
-            <a:ext cx="3569653" cy="4572000"/>
+            <a:ext cx="5201336" cy="4572000"/>
           </a:xfrm>
         </p:spPr>
         <p:txBody>
@@ -9988,42 +11317,22 @@
           <a:p>
             <a:r>
               <a:rPr lang="en-US" sz="1800" dirty="0" smtClean="0"/>
-              <a:t>There is a clear indication that making the playoffs (Blue) shows that a higher shooting percentage and </a:t>
-            </a:r>
-            <a:r>
-              <a:rPr lang="en-US" sz="1800" dirty="0" err="1" smtClean="0"/>
-              <a:t>Corsi</a:t>
-            </a:r>
-            <a:r>
-              <a:rPr lang="en-US" sz="1800" dirty="0" smtClean="0"/>
-              <a:t> make the playoffs</a:t>
-            </a:r>
-          </a:p>
-          <a:p>
-            <a:r>
-              <a:rPr lang="en-US" sz="1800" dirty="0" smtClean="0"/>
-              <a:t>However, there is a significantly wider distribution of results for those that make the playoffs</a:t>
-            </a:r>
-          </a:p>
-          <a:p>
-            <a:r>
-              <a:rPr lang="en-US" sz="1800" dirty="0" smtClean="0"/>
-              <a:t>Some statistics like </a:t>
-            </a:r>
-            <a:r>
-              <a:rPr lang="en-US" sz="1800" dirty="0" err="1" smtClean="0"/>
-              <a:t>Corsi</a:t>
-            </a:r>
-            <a:r>
-              <a:rPr lang="en-US" sz="1800" dirty="0" smtClean="0"/>
-              <a:t> “for” and “against” are analogues so one is dropped to limit amount of possible features</a:t>
-            </a:r>
+              <a:t>After looking through the datasets it was easy to see that certain statistics had high levels of </a:t>
+            </a:r>
+            <a:r>
+              <a:rPr lang="fi-FI" sz="1800" dirty="0" err="1" smtClean="0"/>
+              <a:t>collinearity</a:t>
+            </a:r>
+            <a:endParaRPr lang="en-US" sz="1800" dirty="0" smtClean="0"/>
+          </a:p>
+          <a:p>
+            <a:endParaRPr lang="en-US" sz="1800" dirty="0" smtClean="0"/>
           </a:p>
         </p:txBody>
       </p:sp>
       <p:pic>
         <p:nvPicPr>
-          <p:cNvPr id="4" name="Picture 3"/>
+          <p:cNvPr id="5" name="Picture 4"/>
           <p:cNvPicPr>
             <a:picLocks noChangeAspect="1"/>
           </p:cNvPicPr>
@@ -10037,8 +11346,8 @@
         </p:blipFill>
         <p:spPr>
           <a:xfrm>
-            <a:off x="4083063" y="1512384"/>
-            <a:ext cx="4851400" cy="3403600"/>
+            <a:off x="5397675" y="1527048"/>
+            <a:ext cx="3438477" cy="2549982"/>
           </a:xfrm>
           <a:prstGeom prst="rect">
             <a:avLst/>
@@ -10047,7 +11356,7 @@
       </p:pic>
       <p:pic>
         <p:nvPicPr>
-          <p:cNvPr id="8" name="Picture 7"/>
+          <p:cNvPr id="6" name="Picture 5"/>
           <p:cNvPicPr>
             <a:picLocks noChangeAspect="1"/>
           </p:cNvPicPr>
@@ -10061,18 +11370,227 @@
         </p:blipFill>
         <p:spPr>
           <a:xfrm>
-            <a:off x="4542490" y="4848804"/>
-            <a:ext cx="4098286" cy="1514226"/>
+            <a:off x="301752" y="3051382"/>
+            <a:ext cx="5104271" cy="3394648"/>
           </a:xfrm>
           <a:prstGeom prst="rect">
             <a:avLst/>
           </a:prstGeom>
         </p:spPr>
       </p:pic>
+      <p:sp>
+        <p:nvSpPr>
+          <p:cNvPr id="7" name="Content Placeholder 2"/>
+          <p:cNvSpPr txBox="1">
+            <a:spLocks/>
+          </p:cNvSpPr>
+          <p:nvPr/>
+        </p:nvSpPr>
+        <p:spPr>
+          <a:xfrm>
+            <a:off x="5535652" y="4160030"/>
+            <a:ext cx="3435360" cy="2203000"/>
+          </a:xfrm>
+          <a:prstGeom prst="rect">
+            <a:avLst/>
+          </a:prstGeom>
+        </p:spPr>
+        <p:txBody>
+          <a:bodyPr vert="horz" rIns="457200">
+            <a:normAutofit/>
+          </a:bodyPr>
+          <a:lstStyle>
+            <a:lvl1pPr marL="274320" indent="-274320" algn="l" rtl="0" eaLnBrk="1" latinLnBrk="0" hangingPunct="1">
+              <a:spcBef>
+                <a:spcPct val="20000"/>
+              </a:spcBef>
+              <a:buClr>
+                <a:schemeClr val="accent1"/>
+              </a:buClr>
+              <a:buSzPct val="85000"/>
+              <a:buFont typeface="Wingdings 2"/>
+              <a:buChar char=""/>
+              <a:defRPr kumimoji="0" sz="2700" kern="1200">
+                <a:solidFill>
+                  <a:schemeClr val="tx1"/>
+                </a:solidFill>
+                <a:latin typeface="+mn-lt"/>
+                <a:ea typeface="+mn-ea"/>
+                <a:cs typeface="+mn-cs"/>
+              </a:defRPr>
+            </a:lvl1pPr>
+            <a:lvl2pPr marL="548640" indent="-274320" algn="l" rtl="0" eaLnBrk="1" latinLnBrk="0" hangingPunct="1">
+              <a:spcBef>
+                <a:spcPct val="20000"/>
+              </a:spcBef>
+              <a:buClr>
+                <a:schemeClr val="accent2"/>
+              </a:buClr>
+              <a:buSzPct val="70000"/>
+              <a:buFont typeface="Wingdings"/>
+              <a:buChar char=""/>
+              <a:defRPr kumimoji="0" sz="2200" kern="1200">
+                <a:solidFill>
+                  <a:schemeClr val="tx2"/>
+                </a:solidFill>
+                <a:latin typeface="+mn-lt"/>
+                <a:ea typeface="+mn-ea"/>
+                <a:cs typeface="+mn-cs"/>
+              </a:defRPr>
+            </a:lvl2pPr>
+            <a:lvl3pPr marL="822960" indent="-228600" algn="l" rtl="0" eaLnBrk="1" latinLnBrk="0" hangingPunct="1">
+              <a:spcBef>
+                <a:spcPct val="20000"/>
+              </a:spcBef>
+              <a:buClr>
+                <a:schemeClr val="accent3"/>
+              </a:buClr>
+              <a:buSzPct val="75000"/>
+              <a:buFont typeface="Wingdings 2"/>
+              <a:buChar char=""/>
+              <a:defRPr kumimoji="0" sz="2000" kern="1200">
+                <a:solidFill>
+                  <a:schemeClr val="tx1"/>
+                </a:solidFill>
+                <a:latin typeface="+mn-lt"/>
+                <a:ea typeface="+mn-ea"/>
+                <a:cs typeface="+mn-cs"/>
+              </a:defRPr>
+            </a:lvl3pPr>
+            <a:lvl4pPr marL="1097280" indent="-228600" algn="l" rtl="0" eaLnBrk="1" latinLnBrk="0" hangingPunct="1">
+              <a:spcBef>
+                <a:spcPct val="20000"/>
+              </a:spcBef>
+              <a:buClr>
+                <a:schemeClr val="accent4"/>
+              </a:buClr>
+              <a:buSzPct val="70000"/>
+              <a:buFont typeface="Wingdings"/>
+              <a:buChar char=""/>
+              <a:defRPr kumimoji="0" sz="2000" kern="1200">
+                <a:solidFill>
+                  <a:schemeClr val="tx2"/>
+                </a:solidFill>
+                <a:latin typeface="+mn-lt"/>
+                <a:ea typeface="+mn-ea"/>
+                <a:cs typeface="+mn-cs"/>
+              </a:defRPr>
+            </a:lvl4pPr>
+            <a:lvl5pPr marL="1371600" indent="-228600" algn="l" rtl="0" eaLnBrk="1" latinLnBrk="0" hangingPunct="1">
+              <a:spcBef>
+                <a:spcPct val="20000"/>
+              </a:spcBef>
+              <a:buClr>
+                <a:schemeClr val="accent5"/>
+              </a:buClr>
+              <a:buFontTx/>
+              <a:buChar char="•"/>
+              <a:defRPr kumimoji="0" sz="1800" kern="1200">
+                <a:solidFill>
+                  <a:schemeClr val="tx1"/>
+                </a:solidFill>
+                <a:latin typeface="+mn-lt"/>
+                <a:ea typeface="+mn-ea"/>
+                <a:cs typeface="+mn-cs"/>
+              </a:defRPr>
+            </a:lvl5pPr>
+            <a:lvl6pPr marL="1645920" indent="-182880" algn="l" rtl="0" eaLnBrk="1" latinLnBrk="0" hangingPunct="1">
+              <a:spcBef>
+                <a:spcPct val="20000"/>
+              </a:spcBef>
+              <a:buClr>
+                <a:schemeClr val="accent6"/>
+              </a:buClr>
+              <a:buSzPct val="80000"/>
+              <a:buFont typeface="Wingdings 2"/>
+              <a:buChar char=""/>
+              <a:defRPr kumimoji="0" sz="1800" kern="1200">
+                <a:solidFill>
+                  <a:schemeClr val="tx1"/>
+                </a:solidFill>
+                <a:latin typeface="+mn-lt"/>
+                <a:ea typeface="+mn-ea"/>
+                <a:cs typeface="+mn-cs"/>
+              </a:defRPr>
+            </a:lvl6pPr>
+            <a:lvl7pPr marL="1920240" indent="-182880" algn="l" rtl="0" eaLnBrk="1" latinLnBrk="0" hangingPunct="1">
+              <a:spcBef>
+                <a:spcPct val="20000"/>
+              </a:spcBef>
+              <a:buClr>
+                <a:schemeClr val="accent1">
+                  <a:shade val="75000"/>
+                </a:schemeClr>
+              </a:buClr>
+              <a:buSzPct val="90000"/>
+              <a:buChar char="•"/>
+              <a:defRPr kumimoji="0" sz="1600" kern="1200" baseline="0">
+                <a:solidFill>
+                  <a:schemeClr val="tx1"/>
+                </a:solidFill>
+                <a:latin typeface="+mn-lt"/>
+                <a:ea typeface="+mn-ea"/>
+                <a:cs typeface="+mn-cs"/>
+              </a:defRPr>
+            </a:lvl7pPr>
+            <a:lvl8pPr marL="2103120" indent="-182880" algn="l" rtl="0" eaLnBrk="1" latinLnBrk="0" hangingPunct="1">
+              <a:spcBef>
+                <a:spcPct val="20000"/>
+              </a:spcBef>
+              <a:buClr>
+                <a:schemeClr val="accent4">
+                  <a:shade val="75000"/>
+                </a:schemeClr>
+              </a:buClr>
+              <a:buChar char="•"/>
+              <a:defRPr kumimoji="0" sz="1600" kern="1200">
+                <a:solidFill>
+                  <a:schemeClr val="tx1"/>
+                </a:solidFill>
+                <a:latin typeface="+mn-lt"/>
+                <a:ea typeface="+mn-ea"/>
+                <a:cs typeface="+mn-cs"/>
+              </a:defRPr>
+            </a:lvl8pPr>
+            <a:lvl9pPr marL="2377440" indent="-182880" algn="l" rtl="0" eaLnBrk="1" latinLnBrk="0" hangingPunct="1">
+              <a:spcBef>
+                <a:spcPct val="20000"/>
+              </a:spcBef>
+              <a:buClr>
+                <a:schemeClr val="accent2">
+                  <a:shade val="75000"/>
+                </a:schemeClr>
+              </a:buClr>
+              <a:buSzPct val="90000"/>
+              <a:buChar char="•"/>
+              <a:defRPr kumimoji="0" sz="1400" kern="1200" cap="all" baseline="0">
+                <a:solidFill>
+                  <a:schemeClr val="tx1"/>
+                </a:solidFill>
+                <a:latin typeface="+mn-lt"/>
+                <a:ea typeface="+mn-ea"/>
+                <a:cs typeface="+mn-cs"/>
+              </a:defRPr>
+            </a:lvl9pPr>
+          </a:lstStyle>
+          <a:p>
+            <a:r>
+              <a:rPr lang="en-US" sz="1800" dirty="0" smtClean="0"/>
+              <a:t>Data also appears to be normally distributed</a:t>
+            </a:r>
+          </a:p>
+          <a:p>
+            <a:r>
+              <a:rPr lang="en-US" sz="1800" dirty="0" smtClean="0"/>
+              <a:t>This will make it easier for modeling as it will mean avoiding a transformation</a:t>
+            </a:r>
+          </a:p>
+        </p:txBody>
+      </p:sp>
     </p:spTree>
     <p:extLst>
       <p:ext uri="{BB962C8B-B14F-4D97-AF65-F5344CB8AC3E}">
-        <p14:creationId xmlns:p14="http://schemas.microsoft.com/office/powerpoint/2010/main" val="3345668013"/>
+        <p14:creationId xmlns:p14="http://schemas.microsoft.com/office/powerpoint/2010/main" val="1456697042"/>
       </p:ext>
     </p:extLst>
   </p:cSld>
@@ -10116,7 +11634,7 @@
           <a:p>
             <a:r>
               <a:rPr lang="en-US" dirty="0" smtClean="0"/>
-              <a:t>Modeling Approach</a:t>
+              <a:t>Exploratory Data Analysis</a:t>
             </a:r>
             <a:endParaRPr lang="en-US" dirty="0"/>
           </a:p>
@@ -10134,7 +11652,7 @@
         </p:nvSpPr>
         <p:spPr>
           <a:xfrm>
-            <a:off x="513410" y="1677069"/>
+            <a:off x="513410" y="1791030"/>
             <a:ext cx="3569653" cy="4572000"/>
           </a:xfrm>
         </p:spPr>
@@ -10144,323 +11662,59 @@
           </a:bodyPr>
           <a:lstStyle/>
           <a:p>
-            <a:pPr marL="0" indent="0">
-              <a:buNone/>
-            </a:pPr>
-            <a:r>
-              <a:rPr lang="en-US" sz="2400" dirty="0" err="1" smtClean="0"/>
-              <a:t>Logit</a:t>
-            </a:r>
-            <a:r>
-              <a:rPr lang="en-US" sz="2400" dirty="0" smtClean="0"/>
-              <a:t> Model</a:t>
-            </a:r>
-          </a:p>
-          <a:p>
-            <a:pPr marL="457200" indent="-457200">
-              <a:buFont typeface="+mj-lt"/>
-              <a:buAutoNum type="arabicPeriod"/>
-            </a:pPr>
-            <a:r>
-              <a:rPr lang="en-US" sz="2000" dirty="0" smtClean="0"/>
-              <a:t>Iterate through every feature combination</a:t>
-            </a:r>
-          </a:p>
-          <a:p>
-            <a:pPr marL="457200" indent="-457200">
-              <a:buFont typeface="+mj-lt"/>
-              <a:buAutoNum type="arabicPeriod"/>
-            </a:pPr>
-            <a:r>
-              <a:rPr lang="en-US" sz="2000" dirty="0" smtClean="0"/>
-              <a:t>Identify best fit</a:t>
-            </a:r>
-          </a:p>
-          <a:p>
-            <a:pPr marL="457200" indent="-457200">
-              <a:buFont typeface="+mj-lt"/>
-              <a:buAutoNum type="arabicPeriod"/>
-            </a:pPr>
-            <a:r>
-              <a:rPr lang="en-US" sz="2000" dirty="0" smtClean="0"/>
-              <a:t>Ensure best Adj. R</a:t>
-            </a:r>
-            <a:r>
-              <a:rPr lang="en-US" sz="2000" baseline="30000" dirty="0" smtClean="0"/>
-              <a:t>2</a:t>
-            </a:r>
-          </a:p>
-        </p:txBody>
-      </p:sp>
-      <p:sp>
-        <p:nvSpPr>
-          <p:cNvPr id="6" name="Content Placeholder 2"/>
-          <p:cNvSpPr txBox="1">
-            <a:spLocks/>
-          </p:cNvSpPr>
-          <p:nvPr/>
-        </p:nvSpPr>
-        <p:spPr>
-          <a:xfrm>
-            <a:off x="5266499" y="1677069"/>
-            <a:ext cx="3569653" cy="4572000"/>
-          </a:xfrm>
-          <a:prstGeom prst="rect">
-            <a:avLst/>
-          </a:prstGeom>
-        </p:spPr>
-        <p:txBody>
-          <a:bodyPr vert="horz" rIns="457200">
-            <a:normAutofit/>
-          </a:bodyPr>
-          <a:lstStyle>
-            <a:lvl1pPr marL="274320" indent="-274320" algn="l" rtl="0" eaLnBrk="1" latinLnBrk="0" hangingPunct="1">
-              <a:spcBef>
-                <a:spcPct val="20000"/>
-              </a:spcBef>
-              <a:buClr>
-                <a:schemeClr val="accent1"/>
-              </a:buClr>
-              <a:buSzPct val="85000"/>
-              <a:buFont typeface="Wingdings 2"/>
-              <a:buChar char=""/>
-              <a:defRPr kumimoji="0" sz="2700" kern="1200">
-                <a:solidFill>
-                  <a:schemeClr val="tx1"/>
-                </a:solidFill>
-                <a:latin typeface="+mn-lt"/>
-                <a:ea typeface="+mn-ea"/>
-                <a:cs typeface="+mn-cs"/>
-              </a:defRPr>
-            </a:lvl1pPr>
-            <a:lvl2pPr marL="548640" indent="-274320" algn="l" rtl="0" eaLnBrk="1" latinLnBrk="0" hangingPunct="1">
-              <a:spcBef>
-                <a:spcPct val="20000"/>
-              </a:spcBef>
-              <a:buClr>
-                <a:schemeClr val="accent2"/>
-              </a:buClr>
-              <a:buSzPct val="70000"/>
-              <a:buFont typeface="Wingdings"/>
-              <a:buChar char=""/>
-              <a:defRPr kumimoji="0" sz="2200" kern="1200">
-                <a:solidFill>
-                  <a:schemeClr val="tx2"/>
-                </a:solidFill>
-                <a:latin typeface="+mn-lt"/>
-                <a:ea typeface="+mn-ea"/>
-                <a:cs typeface="+mn-cs"/>
-              </a:defRPr>
-            </a:lvl2pPr>
-            <a:lvl3pPr marL="822960" indent="-228600" algn="l" rtl="0" eaLnBrk="1" latinLnBrk="0" hangingPunct="1">
-              <a:spcBef>
-                <a:spcPct val="20000"/>
-              </a:spcBef>
-              <a:buClr>
-                <a:schemeClr val="accent3"/>
-              </a:buClr>
-              <a:buSzPct val="75000"/>
-              <a:buFont typeface="Wingdings 2"/>
-              <a:buChar char=""/>
-              <a:defRPr kumimoji="0" sz="2000" kern="1200">
-                <a:solidFill>
-                  <a:schemeClr val="tx1"/>
-                </a:solidFill>
-                <a:latin typeface="+mn-lt"/>
-                <a:ea typeface="+mn-ea"/>
-                <a:cs typeface="+mn-cs"/>
-              </a:defRPr>
-            </a:lvl3pPr>
-            <a:lvl4pPr marL="1097280" indent="-228600" algn="l" rtl="0" eaLnBrk="1" latinLnBrk="0" hangingPunct="1">
-              <a:spcBef>
-                <a:spcPct val="20000"/>
-              </a:spcBef>
-              <a:buClr>
-                <a:schemeClr val="accent4"/>
-              </a:buClr>
-              <a:buSzPct val="70000"/>
-              <a:buFont typeface="Wingdings"/>
-              <a:buChar char=""/>
-              <a:defRPr kumimoji="0" sz="2000" kern="1200">
-                <a:solidFill>
-                  <a:schemeClr val="tx2"/>
-                </a:solidFill>
-                <a:latin typeface="+mn-lt"/>
-                <a:ea typeface="+mn-ea"/>
-                <a:cs typeface="+mn-cs"/>
-              </a:defRPr>
-            </a:lvl4pPr>
-            <a:lvl5pPr marL="1371600" indent="-228600" algn="l" rtl="0" eaLnBrk="1" latinLnBrk="0" hangingPunct="1">
-              <a:spcBef>
-                <a:spcPct val="20000"/>
-              </a:spcBef>
-              <a:buClr>
-                <a:schemeClr val="accent5"/>
-              </a:buClr>
-              <a:buFontTx/>
-              <a:buChar char="•"/>
-              <a:defRPr kumimoji="0" sz="1800" kern="1200">
-                <a:solidFill>
-                  <a:schemeClr val="tx1"/>
-                </a:solidFill>
-                <a:latin typeface="+mn-lt"/>
-                <a:ea typeface="+mn-ea"/>
-                <a:cs typeface="+mn-cs"/>
-              </a:defRPr>
-            </a:lvl5pPr>
-            <a:lvl6pPr marL="1645920" indent="-182880" algn="l" rtl="0" eaLnBrk="1" latinLnBrk="0" hangingPunct="1">
-              <a:spcBef>
-                <a:spcPct val="20000"/>
-              </a:spcBef>
-              <a:buClr>
-                <a:schemeClr val="accent6"/>
-              </a:buClr>
-              <a:buSzPct val="80000"/>
-              <a:buFont typeface="Wingdings 2"/>
-              <a:buChar char=""/>
-              <a:defRPr kumimoji="0" sz="1800" kern="1200">
-                <a:solidFill>
-                  <a:schemeClr val="tx1"/>
-                </a:solidFill>
-                <a:latin typeface="+mn-lt"/>
-                <a:ea typeface="+mn-ea"/>
-                <a:cs typeface="+mn-cs"/>
-              </a:defRPr>
-            </a:lvl6pPr>
-            <a:lvl7pPr marL="1920240" indent="-182880" algn="l" rtl="0" eaLnBrk="1" latinLnBrk="0" hangingPunct="1">
-              <a:spcBef>
-                <a:spcPct val="20000"/>
-              </a:spcBef>
-              <a:buClr>
-                <a:schemeClr val="accent1">
-                  <a:shade val="75000"/>
-                </a:schemeClr>
-              </a:buClr>
-              <a:buSzPct val="90000"/>
-              <a:buChar char="•"/>
-              <a:defRPr kumimoji="0" sz="1600" kern="1200" baseline="0">
-                <a:solidFill>
-                  <a:schemeClr val="tx1"/>
-                </a:solidFill>
-                <a:latin typeface="+mn-lt"/>
-                <a:ea typeface="+mn-ea"/>
-                <a:cs typeface="+mn-cs"/>
-              </a:defRPr>
-            </a:lvl7pPr>
-            <a:lvl8pPr marL="2103120" indent="-182880" algn="l" rtl="0" eaLnBrk="1" latinLnBrk="0" hangingPunct="1">
-              <a:spcBef>
-                <a:spcPct val="20000"/>
-              </a:spcBef>
-              <a:buClr>
-                <a:schemeClr val="accent4">
-                  <a:shade val="75000"/>
-                </a:schemeClr>
-              </a:buClr>
-              <a:buChar char="•"/>
-              <a:defRPr kumimoji="0" sz="1600" kern="1200">
-                <a:solidFill>
-                  <a:schemeClr val="tx1"/>
-                </a:solidFill>
-                <a:latin typeface="+mn-lt"/>
-                <a:ea typeface="+mn-ea"/>
-                <a:cs typeface="+mn-cs"/>
-              </a:defRPr>
-            </a:lvl8pPr>
-            <a:lvl9pPr marL="2377440" indent="-182880" algn="l" rtl="0" eaLnBrk="1" latinLnBrk="0" hangingPunct="1">
-              <a:spcBef>
-                <a:spcPct val="20000"/>
-              </a:spcBef>
-              <a:buClr>
-                <a:schemeClr val="accent2">
-                  <a:shade val="75000"/>
-                </a:schemeClr>
-              </a:buClr>
-              <a:buSzPct val="90000"/>
-              <a:buChar char="•"/>
-              <a:defRPr kumimoji="0" sz="1400" kern="1200" cap="all" baseline="0">
-                <a:solidFill>
-                  <a:schemeClr val="tx1"/>
-                </a:solidFill>
-                <a:latin typeface="+mn-lt"/>
-                <a:ea typeface="+mn-ea"/>
-                <a:cs typeface="+mn-cs"/>
-              </a:defRPr>
-            </a:lvl9pPr>
-          </a:lstStyle>
-          <a:p>
-            <a:pPr marL="0" indent="0">
-              <a:buNone/>
-            </a:pPr>
-            <a:r>
-              <a:rPr lang="en-US" sz="2400" dirty="0" smtClean="0"/>
-              <a:t>Decision Tree Model</a:t>
-            </a:r>
-          </a:p>
-          <a:p>
-            <a:pPr marL="457200" indent="-457200">
-              <a:buFont typeface="+mj-lt"/>
-              <a:buAutoNum type="arabicPeriod"/>
-            </a:pPr>
-            <a:r>
-              <a:rPr lang="en-US" sz="2000" dirty="0" smtClean="0"/>
-              <a:t>Minimize tree depth</a:t>
-            </a:r>
-            <a:endParaRPr lang="en-US" sz="2000" dirty="0"/>
-          </a:p>
-          <a:p>
-            <a:pPr marL="457200" indent="-457200">
-              <a:buFont typeface="+mj-lt"/>
-              <a:buAutoNum type="arabicPeriod"/>
-            </a:pPr>
-            <a:r>
-              <a:rPr lang="en-US" sz="2000" dirty="0" smtClean="0"/>
-              <a:t>Use even splits</a:t>
-            </a:r>
-            <a:endParaRPr lang="en-US" sz="2000" dirty="0"/>
-          </a:p>
-          <a:p>
-            <a:pPr marL="457200" indent="-457200">
-              <a:buFont typeface="+mj-lt"/>
-              <a:buAutoNum type="arabicPeriod"/>
-            </a:pPr>
-            <a:r>
-              <a:rPr lang="en-US" sz="2000" dirty="0" smtClean="0"/>
-              <a:t>Strong confidence in results</a:t>
-            </a:r>
-            <a:endParaRPr lang="en-US" sz="2000" baseline="30000" dirty="0"/>
-          </a:p>
-          <a:p>
-            <a:pPr marL="0" indent="0">
-              <a:buNone/>
-            </a:pPr>
-            <a:endParaRPr lang="en-US" sz="2400" dirty="0" smtClean="0"/>
+            <a:r>
+              <a:rPr lang="en-US" sz="1800" dirty="0" smtClean="0"/>
+              <a:t>There is a clear indication that making the playoffs (Blue) shows that a higher shooting percentage and </a:t>
+            </a:r>
+            <a:r>
+              <a:rPr lang="en-US" sz="1800" dirty="0" err="1" smtClean="0"/>
+              <a:t>Corsi</a:t>
+            </a:r>
+            <a:r>
+              <a:rPr lang="en-US" sz="1800" dirty="0" smtClean="0"/>
+              <a:t> make the playoffs</a:t>
+            </a:r>
+          </a:p>
+          <a:p>
+            <a:r>
+              <a:rPr lang="en-US" sz="1800" dirty="0" smtClean="0"/>
+              <a:t>However, there is a significantly wider distribution of results for those that make the playoffs</a:t>
+            </a:r>
+          </a:p>
+          <a:p>
+            <a:r>
+              <a:rPr lang="en-US" sz="1800" dirty="0" smtClean="0"/>
+              <a:t>Some statistics like </a:t>
+            </a:r>
+            <a:r>
+              <a:rPr lang="en-US" sz="1800" dirty="0" err="1" smtClean="0"/>
+              <a:t>Corsi</a:t>
+            </a:r>
+            <a:r>
+              <a:rPr lang="en-US" sz="1800" dirty="0" smtClean="0"/>
+              <a:t> “for” and “against” are analogues so one is dropped to limit amount of possible features</a:t>
+            </a:r>
           </a:p>
         </p:txBody>
       </p:sp>
       <p:pic>
         <p:nvPicPr>
-          <p:cNvPr id="10" name="Picture 9" descr="Screen Shot 2016-03-28 at 9.32.45 PM.png"/>
+          <p:cNvPr id="4" name="Picture 3"/>
           <p:cNvPicPr>
             <a:picLocks noChangeAspect="1"/>
           </p:cNvPicPr>
           <p:nvPr/>
         </p:nvPicPr>
         <p:blipFill>
-          <a:blip r:embed="rId2">
-            <a:extLst>
-              <a:ext uri="{28A0092B-C50C-407E-A947-70E740481C1C}">
-                <a14:useLocalDpi xmlns:a14="http://schemas.microsoft.com/office/drawing/2010/main" val="0"/>
-              </a:ext>
-            </a:extLst>
-          </a:blip>
+          <a:blip r:embed="rId2"/>
           <a:stretch>
             <a:fillRect/>
           </a:stretch>
         </p:blipFill>
         <p:spPr>
           <a:xfrm>
-            <a:off x="513410" y="3731784"/>
-            <a:ext cx="3733800" cy="1816100"/>
+            <a:off x="4083063" y="1512384"/>
+            <a:ext cx="4851400" cy="3403600"/>
           </a:xfrm>
           <a:prstGeom prst="rect">
             <a:avLst/>
@@ -10469,28 +11723,22 @@
       </p:pic>
       <p:pic>
         <p:nvPicPr>
-          <p:cNvPr id="13" name="Picture 12" descr="Screen Shot 2016-03-28 at 9.33.22 PM.png"/>
+          <p:cNvPr id="8" name="Picture 7"/>
           <p:cNvPicPr>
             <a:picLocks noChangeAspect="1"/>
           </p:cNvPicPr>
           <p:nvPr/>
         </p:nvPicPr>
         <p:blipFill>
-          <a:blip r:embed="rId3">
-            <a:extLst>
-              <a:ext uri="{28A0092B-C50C-407E-A947-70E740481C1C}">
-                <a14:useLocalDpi xmlns:a14="http://schemas.microsoft.com/office/drawing/2010/main" val="0"/>
-              </a:ext>
-            </a:extLst>
-          </a:blip>
+          <a:blip r:embed="rId3"/>
           <a:stretch>
             <a:fillRect/>
           </a:stretch>
         </p:blipFill>
         <p:spPr>
           <a:xfrm>
-            <a:off x="2718262" y="5330486"/>
-            <a:ext cx="6099392" cy="918583"/>
+            <a:off x="4542490" y="4848804"/>
+            <a:ext cx="4098286" cy="1514226"/>
           </a:xfrm>
           <a:prstGeom prst="rect">
             <a:avLst/>
@@ -10500,7 +11748,7 @@
     </p:spTree>
     <p:extLst>
       <p:ext uri="{BB962C8B-B14F-4D97-AF65-F5344CB8AC3E}">
-        <p14:creationId xmlns:p14="http://schemas.microsoft.com/office/powerpoint/2010/main" val="3955794720"/>
+        <p14:creationId xmlns:p14="http://schemas.microsoft.com/office/powerpoint/2010/main" val="3345668013"/>
       </p:ext>
     </p:extLst>
   </p:cSld>

</xml_diff>